<commit_message>
Cleaned up the powerpoint slides
</commit_message>
<xml_diff>
--- a/Project 3-Global Climate Change.pptx
+++ b/Project 3-Global Climate Change.pptx
@@ -7,11 +7,10 @@
   <p:sldIdLst>
     <p:sldId id="256" r:id="rId2"/>
     <p:sldId id="257" r:id="rId3"/>
-    <p:sldId id="258" r:id="rId4"/>
-    <p:sldId id="261" r:id="rId5"/>
-    <p:sldId id="262" r:id="rId6"/>
-    <p:sldId id="260" r:id="rId7"/>
-    <p:sldId id="259" r:id="rId8"/>
+    <p:sldId id="261" r:id="rId4"/>
+    <p:sldId id="262" r:id="rId5"/>
+    <p:sldId id="260" r:id="rId6"/>
+    <p:sldId id="259" r:id="rId7"/>
   </p:sldIdLst>
   <p:sldSz cx="12192000" cy="6858000"/>
   <p:notesSz cx="6858000" cy="9144000"/>
@@ -168,7 +167,7 @@
           <a:noFill/>
           <a:extLst>
             <a:ext uri="{909E8E84-426E-40dd-AFC4-6F175D3DCCD1}">
-              <a14:hiddenFill xmlns:a14="http://schemas.microsoft.com/office/drawing/2010/main" xmlns="">
+              <a14:hiddenFill xmlns="" xmlns:a14="http://schemas.microsoft.com/office/drawing/2010/main">
                 <a:solidFill>
                   <a:srgbClr val="FFFFFF"/>
                 </a:solidFill>
@@ -228,7 +227,7 @@
             </a:ln>
             <a:extLst>
               <a:ext uri="{91240B29-F687-4f45-9708-019B960494DF}">
-                <a14:hiddenLine xmlns:a14="http://schemas.microsoft.com/office/drawing/2010/main" xmlns="" w="9525">
+                <a14:hiddenLine xmlns="" xmlns:a14="http://schemas.microsoft.com/office/drawing/2010/main" w="9525">
                   <a:solidFill>
                     <a:srgbClr val="000000"/>
                   </a:solidFill>
@@ -318,7 +317,7 @@
             </a:ln>
             <a:extLst>
               <a:ext uri="{91240B29-F687-4f45-9708-019B960494DF}">
-                <a14:hiddenLine xmlns:a14="http://schemas.microsoft.com/office/drawing/2010/main" xmlns="" w="9525">
+                <a14:hiddenLine xmlns="" xmlns:a14="http://schemas.microsoft.com/office/drawing/2010/main" w="9525">
                   <a:solidFill>
                     <a:srgbClr val="000000"/>
                   </a:solidFill>
@@ -408,7 +407,7 @@
             </a:ln>
             <a:extLst>
               <a:ext uri="{91240B29-F687-4f45-9708-019B960494DF}">
-                <a14:hiddenLine xmlns:a14="http://schemas.microsoft.com/office/drawing/2010/main" xmlns="" w="9525">
+                <a14:hiddenLine xmlns="" xmlns:a14="http://schemas.microsoft.com/office/drawing/2010/main" w="9525">
                   <a:solidFill>
                     <a:srgbClr val="000000"/>
                   </a:solidFill>
@@ -442,7 +441,7 @@
             </a:ln>
             <a:extLst>
               <a:ext uri="{91240B29-F687-4f45-9708-019B960494DF}">
-                <a14:hiddenLine xmlns:a14="http://schemas.microsoft.com/office/drawing/2010/main" xmlns="" w="9525">
+                <a14:hiddenLine xmlns="" xmlns:a14="http://schemas.microsoft.com/office/drawing/2010/main" w="9525">
                   <a:solidFill>
                     <a:srgbClr val="000000"/>
                   </a:solidFill>
@@ -532,7 +531,7 @@
             </a:ln>
             <a:extLst>
               <a:ext uri="{91240B29-F687-4f45-9708-019B960494DF}">
-                <a14:hiddenLine xmlns:a14="http://schemas.microsoft.com/office/drawing/2010/main" xmlns="" w="9525">
+                <a14:hiddenLine xmlns="" xmlns:a14="http://schemas.microsoft.com/office/drawing/2010/main" w="9525">
                   <a:solidFill>
                     <a:srgbClr val="000000"/>
                   </a:solidFill>
@@ -594,7 +593,7 @@
             </a:ln>
             <a:extLst>
               <a:ext uri="{91240B29-F687-4f45-9708-019B960494DF}">
-                <a14:hiddenLine xmlns:a14="http://schemas.microsoft.com/office/drawing/2010/main" xmlns="" w="9525">
+                <a14:hiddenLine xmlns="" xmlns:a14="http://schemas.microsoft.com/office/drawing/2010/main" w="9525">
                   <a:solidFill>
                     <a:srgbClr val="000000"/>
                   </a:solidFill>
@@ -656,7 +655,7 @@
             </a:ln>
             <a:extLst>
               <a:ext uri="{91240B29-F687-4f45-9708-019B960494DF}">
-                <a14:hiddenLine xmlns:a14="http://schemas.microsoft.com/office/drawing/2010/main" xmlns="" w="9525">
+                <a14:hiddenLine xmlns="" xmlns:a14="http://schemas.microsoft.com/office/drawing/2010/main" w="9525">
                   <a:solidFill>
                     <a:srgbClr val="000000"/>
                   </a:solidFill>
@@ -746,7 +745,7 @@
             </a:ln>
             <a:extLst>
               <a:ext uri="{91240B29-F687-4f45-9708-019B960494DF}">
-                <a14:hiddenLine xmlns:a14="http://schemas.microsoft.com/office/drawing/2010/main" xmlns="" w="9525">
+                <a14:hiddenLine xmlns="" xmlns:a14="http://schemas.microsoft.com/office/drawing/2010/main" w="9525">
                   <a:solidFill>
                     <a:srgbClr val="000000"/>
                   </a:solidFill>
@@ -808,7 +807,7 @@
             </a:ln>
             <a:extLst>
               <a:ext uri="{91240B29-F687-4f45-9708-019B960494DF}">
-                <a14:hiddenLine xmlns:a14="http://schemas.microsoft.com/office/drawing/2010/main" xmlns="" w="9525">
+                <a14:hiddenLine xmlns="" xmlns:a14="http://schemas.microsoft.com/office/drawing/2010/main" w="9525">
                   <a:solidFill>
                     <a:srgbClr val="000000"/>
                   </a:solidFill>
@@ -870,7 +869,7 @@
             </a:ln>
             <a:extLst>
               <a:ext uri="{91240B29-F687-4f45-9708-019B960494DF}">
-                <a14:hiddenLine xmlns:a14="http://schemas.microsoft.com/office/drawing/2010/main" xmlns="" w="9525">
+                <a14:hiddenLine xmlns="" xmlns:a14="http://schemas.microsoft.com/office/drawing/2010/main" w="9525">
                   <a:solidFill>
                     <a:srgbClr val="000000"/>
                   </a:solidFill>
@@ -960,7 +959,7 @@
             </a:ln>
             <a:extLst>
               <a:ext uri="{91240B29-F687-4f45-9708-019B960494DF}">
-                <a14:hiddenLine xmlns:a14="http://schemas.microsoft.com/office/drawing/2010/main" xmlns="" w="9525">
+                <a14:hiddenLine xmlns="" xmlns:a14="http://schemas.microsoft.com/office/drawing/2010/main" w="9525">
                   <a:solidFill>
                     <a:srgbClr val="000000"/>
                   </a:solidFill>
@@ -1050,7 +1049,7 @@
             </a:ln>
             <a:extLst>
               <a:ext uri="{91240B29-F687-4f45-9708-019B960494DF}">
-                <a14:hiddenLine xmlns:a14="http://schemas.microsoft.com/office/drawing/2010/main" xmlns="" w="9525">
+                <a14:hiddenLine xmlns="" xmlns:a14="http://schemas.microsoft.com/office/drawing/2010/main" w="9525">
                   <a:solidFill>
                     <a:srgbClr val="000000"/>
                   </a:solidFill>
@@ -1112,7 +1111,7 @@
             </a:ln>
             <a:extLst>
               <a:ext uri="{91240B29-F687-4f45-9708-019B960494DF}">
-                <a14:hiddenLine xmlns:a14="http://schemas.microsoft.com/office/drawing/2010/main" xmlns="" w="9525">
+                <a14:hiddenLine xmlns="" xmlns:a14="http://schemas.microsoft.com/office/drawing/2010/main" w="9525">
                   <a:solidFill>
                     <a:srgbClr val="000000"/>
                   </a:solidFill>
@@ -1222,7 +1221,7 @@
             </a:ln>
             <a:extLst>
               <a:ext uri="{91240B29-F687-4f45-9708-019B960494DF}">
-                <a14:hiddenLine xmlns:a14="http://schemas.microsoft.com/office/drawing/2010/main" xmlns="" w="9525">
+                <a14:hiddenLine xmlns="" xmlns:a14="http://schemas.microsoft.com/office/drawing/2010/main" w="9525">
                   <a:solidFill>
                     <a:srgbClr val="000000"/>
                   </a:solidFill>
@@ -1284,7 +1283,7 @@
             </a:ln>
             <a:extLst>
               <a:ext uri="{91240B29-F687-4f45-9708-019B960494DF}">
-                <a14:hiddenLine xmlns:a14="http://schemas.microsoft.com/office/drawing/2010/main" xmlns="" w="9525">
+                <a14:hiddenLine xmlns="" xmlns:a14="http://schemas.microsoft.com/office/drawing/2010/main" w="9525">
                   <a:solidFill>
                     <a:srgbClr val="000000"/>
                   </a:solidFill>
@@ -1374,7 +1373,7 @@
             </a:ln>
             <a:extLst>
               <a:ext uri="{91240B29-F687-4f45-9708-019B960494DF}">
-                <a14:hiddenLine xmlns:a14="http://schemas.microsoft.com/office/drawing/2010/main" xmlns="" w="9525">
+                <a14:hiddenLine xmlns="" xmlns:a14="http://schemas.microsoft.com/office/drawing/2010/main" w="9525">
                   <a:solidFill>
                     <a:srgbClr val="000000"/>
                   </a:solidFill>
@@ -1464,7 +1463,7 @@
             </a:ln>
             <a:extLst>
               <a:ext uri="{91240B29-F687-4f45-9708-019B960494DF}">
-                <a14:hiddenLine xmlns:a14="http://schemas.microsoft.com/office/drawing/2010/main" xmlns="" w="9525">
+                <a14:hiddenLine xmlns="" xmlns:a14="http://schemas.microsoft.com/office/drawing/2010/main" w="9525">
                   <a:solidFill>
                     <a:srgbClr val="000000"/>
                   </a:solidFill>
@@ -1526,7 +1525,7 @@
             </a:ln>
             <a:extLst>
               <a:ext uri="{91240B29-F687-4f45-9708-019B960494DF}">
-                <a14:hiddenLine xmlns:a14="http://schemas.microsoft.com/office/drawing/2010/main" xmlns="" w="9525">
+                <a14:hiddenLine xmlns="" xmlns:a14="http://schemas.microsoft.com/office/drawing/2010/main" w="9525">
                   <a:solidFill>
                     <a:srgbClr val="000000"/>
                   </a:solidFill>
@@ -1616,7 +1615,7 @@
             </a:ln>
             <a:extLst>
               <a:ext uri="{91240B29-F687-4f45-9708-019B960494DF}">
-                <a14:hiddenLine xmlns:a14="http://schemas.microsoft.com/office/drawing/2010/main" xmlns="" w="9525">
+                <a14:hiddenLine xmlns="" xmlns:a14="http://schemas.microsoft.com/office/drawing/2010/main" w="9525">
                   <a:solidFill>
                     <a:srgbClr val="000000"/>
                   </a:solidFill>
@@ -1706,7 +1705,7 @@
             </a:ln>
             <a:extLst>
               <a:ext uri="{91240B29-F687-4f45-9708-019B960494DF}">
-                <a14:hiddenLine xmlns:a14="http://schemas.microsoft.com/office/drawing/2010/main" xmlns="" w="9525">
+                <a14:hiddenLine xmlns="" xmlns:a14="http://schemas.microsoft.com/office/drawing/2010/main" w="9525">
                   <a:solidFill>
                     <a:srgbClr val="000000"/>
                   </a:solidFill>
@@ -1762,7 +1761,7 @@
             </a:ln>
             <a:extLst>
               <a:ext uri="{91240B29-F687-4f45-9708-019B960494DF}">
-                <a14:hiddenLine xmlns:a14="http://schemas.microsoft.com/office/drawing/2010/main" xmlns="" w="9525">
+                <a14:hiddenLine xmlns="" xmlns:a14="http://schemas.microsoft.com/office/drawing/2010/main" w="9525">
                   <a:solidFill>
                     <a:srgbClr val="000000"/>
                   </a:solidFill>
@@ -1852,7 +1851,7 @@
             </a:ln>
             <a:extLst>
               <a:ext uri="{91240B29-F687-4f45-9708-019B960494DF}">
-                <a14:hiddenLine xmlns:a14="http://schemas.microsoft.com/office/drawing/2010/main" xmlns="" w="9525">
+                <a14:hiddenLine xmlns="" xmlns:a14="http://schemas.microsoft.com/office/drawing/2010/main" w="9525">
                   <a:solidFill>
                     <a:srgbClr val="000000"/>
                   </a:solidFill>
@@ -1908,7 +1907,7 @@
             </a:ln>
             <a:extLst>
               <a:ext uri="{91240B29-F687-4f45-9708-019B960494DF}">
-                <a14:hiddenLine xmlns:a14="http://schemas.microsoft.com/office/drawing/2010/main" xmlns="" w="9525">
+                <a14:hiddenLine xmlns="" xmlns:a14="http://schemas.microsoft.com/office/drawing/2010/main" w="9525">
                   <a:solidFill>
                     <a:srgbClr val="000000"/>
                   </a:solidFill>
@@ -1998,7 +1997,7 @@
             </a:ln>
             <a:extLst>
               <a:ext uri="{91240B29-F687-4f45-9708-019B960494DF}">
-                <a14:hiddenLine xmlns:a14="http://schemas.microsoft.com/office/drawing/2010/main" xmlns="" w="9525">
+                <a14:hiddenLine xmlns="" xmlns:a14="http://schemas.microsoft.com/office/drawing/2010/main" w="9525">
                   <a:solidFill>
                     <a:srgbClr val="000000"/>
                   </a:solidFill>
@@ -2066,7 +2065,7 @@
             </a:ln>
             <a:extLst>
               <a:ext uri="{91240B29-F687-4f45-9708-019B960494DF}">
-                <a14:hiddenLine xmlns:a14="http://schemas.microsoft.com/office/drawing/2010/main" xmlns="" w="9525">
+                <a14:hiddenLine xmlns="" xmlns:a14="http://schemas.microsoft.com/office/drawing/2010/main" w="9525">
                   <a:solidFill>
                     <a:srgbClr val="000000"/>
                   </a:solidFill>
@@ -2156,7 +2155,7 @@
             </a:ln>
             <a:extLst>
               <a:ext uri="{91240B29-F687-4f45-9708-019B960494DF}">
-                <a14:hiddenLine xmlns:a14="http://schemas.microsoft.com/office/drawing/2010/main" xmlns="" w="9525">
+                <a14:hiddenLine xmlns="" xmlns:a14="http://schemas.microsoft.com/office/drawing/2010/main" w="9525">
                   <a:solidFill>
                     <a:srgbClr val="000000"/>
                   </a:solidFill>
@@ -2224,7 +2223,7 @@
             </a:ln>
             <a:extLst>
               <a:ext uri="{91240B29-F687-4f45-9708-019B960494DF}">
-                <a14:hiddenLine xmlns:a14="http://schemas.microsoft.com/office/drawing/2010/main" xmlns="" w="9525">
+                <a14:hiddenLine xmlns="" xmlns:a14="http://schemas.microsoft.com/office/drawing/2010/main" w="9525">
                   <a:solidFill>
                     <a:srgbClr val="000000"/>
                   </a:solidFill>
@@ -2314,7 +2313,7 @@
             </a:ln>
             <a:extLst>
               <a:ext uri="{91240B29-F687-4f45-9708-019B960494DF}">
-                <a14:hiddenLine xmlns:a14="http://schemas.microsoft.com/office/drawing/2010/main" xmlns="" w="9525">
+                <a14:hiddenLine xmlns="" xmlns:a14="http://schemas.microsoft.com/office/drawing/2010/main" w="9525">
                   <a:solidFill>
                     <a:srgbClr val="000000"/>
                   </a:solidFill>
@@ -2348,7 +2347,7 @@
             </a:ln>
             <a:extLst>
               <a:ext uri="{91240B29-F687-4f45-9708-019B960494DF}">
-                <a14:hiddenLine xmlns:a14="http://schemas.microsoft.com/office/drawing/2010/main" xmlns="" w="9525">
+                <a14:hiddenLine xmlns="" xmlns:a14="http://schemas.microsoft.com/office/drawing/2010/main" w="9525">
                   <a:solidFill>
                     <a:srgbClr val="000000"/>
                   </a:solidFill>
@@ -2438,7 +2437,7 @@
             </a:ln>
             <a:extLst>
               <a:ext uri="{91240B29-F687-4f45-9708-019B960494DF}">
-                <a14:hiddenLine xmlns:a14="http://schemas.microsoft.com/office/drawing/2010/main" xmlns="" w="9525">
+                <a14:hiddenLine xmlns="" xmlns:a14="http://schemas.microsoft.com/office/drawing/2010/main" w="9525">
                   <a:solidFill>
                     <a:srgbClr val="000000"/>
                   </a:solidFill>
@@ -2500,7 +2499,7 @@
             </a:ln>
             <a:extLst>
               <a:ext uri="{91240B29-F687-4f45-9708-019B960494DF}">
-                <a14:hiddenLine xmlns:a14="http://schemas.microsoft.com/office/drawing/2010/main" xmlns="" w="9525">
+                <a14:hiddenLine xmlns="" xmlns:a14="http://schemas.microsoft.com/office/drawing/2010/main" w="9525">
                   <a:solidFill>
                     <a:srgbClr val="000000"/>
                   </a:solidFill>
@@ -2562,7 +2561,7 @@
             </a:ln>
             <a:extLst>
               <a:ext uri="{91240B29-F687-4f45-9708-019B960494DF}">
-                <a14:hiddenLine xmlns:a14="http://schemas.microsoft.com/office/drawing/2010/main" xmlns="" w="9525">
+                <a14:hiddenLine xmlns="" xmlns:a14="http://schemas.microsoft.com/office/drawing/2010/main" w="9525">
                   <a:solidFill>
                     <a:srgbClr val="000000"/>
                   </a:solidFill>
@@ -2652,7 +2651,7 @@
             </a:ln>
             <a:extLst>
               <a:ext uri="{91240B29-F687-4f45-9708-019B960494DF}">
-                <a14:hiddenLine xmlns:a14="http://schemas.microsoft.com/office/drawing/2010/main" xmlns="" w="9525">
+                <a14:hiddenLine xmlns="" xmlns:a14="http://schemas.microsoft.com/office/drawing/2010/main" w="9525">
                   <a:solidFill>
                     <a:srgbClr val="000000"/>
                   </a:solidFill>
@@ -2720,7 +2719,7 @@
             </a:ln>
             <a:extLst>
               <a:ext uri="{91240B29-F687-4f45-9708-019B960494DF}">
-                <a14:hiddenLine xmlns:a14="http://schemas.microsoft.com/office/drawing/2010/main" xmlns="" w="9525">
+                <a14:hiddenLine xmlns="" xmlns:a14="http://schemas.microsoft.com/office/drawing/2010/main" w="9525">
                   <a:solidFill>
                     <a:srgbClr val="000000"/>
                   </a:solidFill>
@@ -2782,7 +2781,7 @@
             </a:ln>
             <a:extLst>
               <a:ext uri="{91240B29-F687-4f45-9708-019B960494DF}">
-                <a14:hiddenLine xmlns:a14="http://schemas.microsoft.com/office/drawing/2010/main" xmlns="" w="9525">
+                <a14:hiddenLine xmlns="" xmlns:a14="http://schemas.microsoft.com/office/drawing/2010/main" w="9525">
                   <a:solidFill>
                     <a:srgbClr val="000000"/>
                   </a:solidFill>
@@ -2872,7 +2871,7 @@
             </a:ln>
             <a:extLst>
               <a:ext uri="{91240B29-F687-4f45-9708-019B960494DF}">
-                <a14:hiddenLine xmlns:a14="http://schemas.microsoft.com/office/drawing/2010/main" xmlns="" w="9525">
+                <a14:hiddenLine xmlns="" xmlns:a14="http://schemas.microsoft.com/office/drawing/2010/main" w="9525">
                   <a:solidFill>
                     <a:srgbClr val="000000"/>
                   </a:solidFill>
@@ -2934,7 +2933,7 @@
             </a:ln>
             <a:extLst>
               <a:ext uri="{91240B29-F687-4f45-9708-019B960494DF}">
-                <a14:hiddenLine xmlns:a14="http://schemas.microsoft.com/office/drawing/2010/main" xmlns="" w="9525">
+                <a14:hiddenLine xmlns="" xmlns:a14="http://schemas.microsoft.com/office/drawing/2010/main" w="9525">
                   <a:solidFill>
                     <a:srgbClr val="000000"/>
                   </a:solidFill>
@@ -3024,7 +3023,7 @@
             </a:ln>
             <a:extLst>
               <a:ext uri="{91240B29-F687-4f45-9708-019B960494DF}">
-                <a14:hiddenLine xmlns:a14="http://schemas.microsoft.com/office/drawing/2010/main" xmlns="" w="9525">
+                <a14:hiddenLine xmlns="" xmlns:a14="http://schemas.microsoft.com/office/drawing/2010/main" w="9525">
                   <a:solidFill>
                     <a:srgbClr val="000000"/>
                   </a:solidFill>
@@ -3086,7 +3085,7 @@
             </a:ln>
             <a:extLst>
               <a:ext uri="{91240B29-F687-4f45-9708-019B960494DF}">
-                <a14:hiddenLine xmlns:a14="http://schemas.microsoft.com/office/drawing/2010/main" xmlns="" w="9525">
+                <a14:hiddenLine xmlns="" xmlns:a14="http://schemas.microsoft.com/office/drawing/2010/main" w="9525">
                   <a:solidFill>
                     <a:srgbClr val="000000"/>
                   </a:solidFill>
@@ -3176,7 +3175,7 @@
             </a:ln>
             <a:extLst>
               <a:ext uri="{91240B29-F687-4f45-9708-019B960494DF}">
-                <a14:hiddenLine xmlns:a14="http://schemas.microsoft.com/office/drawing/2010/main" xmlns="" w="9525">
+                <a14:hiddenLine xmlns="" xmlns:a14="http://schemas.microsoft.com/office/drawing/2010/main" w="9525">
                   <a:solidFill>
                     <a:srgbClr val="000000"/>
                   </a:solidFill>
@@ -3210,7 +3209,7 @@
             </a:ln>
             <a:extLst>
               <a:ext uri="{91240B29-F687-4f45-9708-019B960494DF}">
-                <a14:hiddenLine xmlns:a14="http://schemas.microsoft.com/office/drawing/2010/main" xmlns="" w="9525">
+                <a14:hiddenLine xmlns="" xmlns:a14="http://schemas.microsoft.com/office/drawing/2010/main" w="9525">
                   <a:solidFill>
                     <a:srgbClr val="000000"/>
                   </a:solidFill>
@@ -3275,7 +3274,7 @@
             </a:ln>
             <a:extLst>
               <a:ext uri="{91240B29-F687-4f45-9708-019B960494DF}">
-                <a14:hiddenLine xmlns:a14="http://schemas.microsoft.com/office/drawing/2010/main" xmlns="" w="9525">
+                <a14:hiddenLine xmlns="" xmlns:a14="http://schemas.microsoft.com/office/drawing/2010/main" w="9525">
                   <a:solidFill>
                     <a:srgbClr val="000000"/>
                   </a:solidFill>
@@ -3365,7 +3364,7 @@
             </a:ln>
             <a:extLst>
               <a:ext uri="{91240B29-F687-4f45-9708-019B960494DF}">
-                <a14:hiddenLine xmlns:a14="http://schemas.microsoft.com/office/drawing/2010/main" xmlns="" w="9525">
+                <a14:hiddenLine xmlns="" xmlns:a14="http://schemas.microsoft.com/office/drawing/2010/main" w="9525">
                   <a:solidFill>
                     <a:srgbClr val="000000"/>
                   </a:solidFill>
@@ -3427,7 +3426,7 @@
             </a:ln>
             <a:extLst>
               <a:ext uri="{91240B29-F687-4f45-9708-019B960494DF}">
-                <a14:hiddenLine xmlns:a14="http://schemas.microsoft.com/office/drawing/2010/main" xmlns="" w="9525">
+                <a14:hiddenLine xmlns="" xmlns:a14="http://schemas.microsoft.com/office/drawing/2010/main" w="9525">
                   <a:solidFill>
                     <a:srgbClr val="000000"/>
                   </a:solidFill>
@@ -3517,7 +3516,7 @@
             </a:ln>
             <a:extLst>
               <a:ext uri="{91240B29-F687-4f45-9708-019B960494DF}">
-                <a14:hiddenLine xmlns:a14="http://schemas.microsoft.com/office/drawing/2010/main" xmlns="" w="9525">
+                <a14:hiddenLine xmlns="" xmlns:a14="http://schemas.microsoft.com/office/drawing/2010/main" w="9525">
                   <a:solidFill>
                     <a:srgbClr val="000000"/>
                   </a:solidFill>
@@ -3607,7 +3606,7 @@
             </a:ln>
             <a:extLst>
               <a:ext uri="{91240B29-F687-4f45-9708-019B960494DF}">
-                <a14:hiddenLine xmlns:a14="http://schemas.microsoft.com/office/drawing/2010/main" xmlns="" w="9525">
+                <a14:hiddenLine xmlns="" xmlns:a14="http://schemas.microsoft.com/office/drawing/2010/main" w="9525">
                   <a:solidFill>
                     <a:srgbClr val="000000"/>
                   </a:solidFill>
@@ -3672,7 +3671,7 @@
             </a:ln>
             <a:extLst>
               <a:ext uri="{91240B29-F687-4f45-9708-019B960494DF}">
-                <a14:hiddenLine xmlns:a14="http://schemas.microsoft.com/office/drawing/2010/main" xmlns="" w="9525">
+                <a14:hiddenLine xmlns="" xmlns:a14="http://schemas.microsoft.com/office/drawing/2010/main" w="9525">
                   <a:solidFill>
                     <a:srgbClr val="000000"/>
                   </a:solidFill>
@@ -3734,7 +3733,7 @@
             </a:ln>
             <a:extLst>
               <a:ext uri="{91240B29-F687-4f45-9708-019B960494DF}">
-                <a14:hiddenLine xmlns:a14="http://schemas.microsoft.com/office/drawing/2010/main" xmlns="" w="9525">
+                <a14:hiddenLine xmlns="" xmlns:a14="http://schemas.microsoft.com/office/drawing/2010/main" w="9525">
                   <a:solidFill>
                     <a:srgbClr val="000000"/>
                   </a:solidFill>
@@ -3824,7 +3823,7 @@
             </a:ln>
             <a:extLst>
               <a:ext uri="{91240B29-F687-4f45-9708-019B960494DF}">
-                <a14:hiddenLine xmlns:a14="http://schemas.microsoft.com/office/drawing/2010/main" xmlns="" w="9525">
+                <a14:hiddenLine xmlns="" xmlns:a14="http://schemas.microsoft.com/office/drawing/2010/main" w="9525">
                   <a:solidFill>
                     <a:srgbClr val="000000"/>
                   </a:solidFill>
@@ -3914,7 +3913,7 @@
             </a:ln>
             <a:extLst>
               <a:ext uri="{91240B29-F687-4f45-9708-019B960494DF}">
-                <a14:hiddenLine xmlns:a14="http://schemas.microsoft.com/office/drawing/2010/main" xmlns="" w="9525">
+                <a14:hiddenLine xmlns="" xmlns:a14="http://schemas.microsoft.com/office/drawing/2010/main" w="9525">
                   <a:solidFill>
                     <a:srgbClr val="000000"/>
                   </a:solidFill>
@@ -3976,7 +3975,7 @@
             </a:ln>
             <a:extLst>
               <a:ext uri="{91240B29-F687-4f45-9708-019B960494DF}">
-                <a14:hiddenLine xmlns:a14="http://schemas.microsoft.com/office/drawing/2010/main" xmlns="" w="9525">
+                <a14:hiddenLine xmlns="" xmlns:a14="http://schemas.microsoft.com/office/drawing/2010/main" w="9525">
                   <a:solidFill>
                     <a:srgbClr val="000000"/>
                   </a:solidFill>
@@ -4096,7 +4095,7 @@
             </a:ln>
             <a:extLst>
               <a:ext uri="{91240B29-F687-4f45-9708-019B960494DF}">
-                <a14:hiddenLine xmlns:a14="http://schemas.microsoft.com/office/drawing/2010/main" xmlns="" w="9525">
+                <a14:hiddenLine xmlns="" xmlns:a14="http://schemas.microsoft.com/office/drawing/2010/main" w="9525">
                   <a:solidFill>
                     <a:srgbClr val="000000"/>
                   </a:solidFill>
@@ -4164,7 +4163,7 @@
             </a:ln>
             <a:extLst>
               <a:ext uri="{91240B29-F687-4f45-9708-019B960494DF}">
-                <a14:hiddenLine xmlns:a14="http://schemas.microsoft.com/office/drawing/2010/main" xmlns="" w="9525">
+                <a14:hiddenLine xmlns="" xmlns:a14="http://schemas.microsoft.com/office/drawing/2010/main" w="9525">
                   <a:solidFill>
                     <a:srgbClr val="000000"/>
                   </a:solidFill>
@@ -4254,7 +4253,7 @@
             </a:ln>
             <a:extLst>
               <a:ext uri="{91240B29-F687-4f45-9708-019B960494DF}">
-                <a14:hiddenLine xmlns:a14="http://schemas.microsoft.com/office/drawing/2010/main" xmlns="" w="9525">
+                <a14:hiddenLine xmlns="" xmlns:a14="http://schemas.microsoft.com/office/drawing/2010/main" w="9525">
                   <a:solidFill>
                     <a:srgbClr val="000000"/>
                   </a:solidFill>
@@ -4394,7 +4393,7 @@
           <a:p>
             <a:fld id="{48A87A34-81AB-432B-8DAE-1953F412C126}" type="datetimeFigureOut">
               <a:rPr lang="en-US" dirty="0"/>
-              <a:t>2/3/25</a:t>
+              <a:t>2/4/25</a:t>
             </a:fld>
             <a:endParaRPr lang="en-US" dirty="0"/>
           </a:p>
@@ -4656,7 +4655,7 @@
           <a:p>
             <a:fld id="{48A87A34-81AB-432B-8DAE-1953F412C126}" type="datetimeFigureOut">
               <a:rPr lang="en-US" dirty="0"/>
-              <a:t>2/3/25</a:t>
+              <a:t>2/4/25</a:t>
             </a:fld>
             <a:endParaRPr lang="en-US" dirty="0"/>
           </a:p>
@@ -4847,7 +4846,7 @@
           <a:p>
             <a:fld id="{48A87A34-81AB-432B-8DAE-1953F412C126}" type="datetimeFigureOut">
               <a:rPr lang="en-US" dirty="0"/>
-              <a:t>2/3/25</a:t>
+              <a:t>2/4/25</a:t>
             </a:fld>
             <a:endParaRPr lang="en-US" dirty="0"/>
           </a:p>
@@ -5105,7 +5104,7 @@
           <a:p>
             <a:fld id="{48A87A34-81AB-432B-8DAE-1953F412C126}" type="datetimeFigureOut">
               <a:rPr lang="en-US" dirty="0"/>
-              <a:t>2/3/25</a:t>
+              <a:t>2/4/25</a:t>
             </a:fld>
             <a:endParaRPr lang="en-US" dirty="0"/>
           </a:p>
@@ -5534,7 +5533,7 @@
           <a:p>
             <a:fld id="{48A87A34-81AB-432B-8DAE-1953F412C126}" type="datetimeFigureOut">
               <a:rPr lang="en-US" dirty="0"/>
-              <a:t>2/3/25</a:t>
+              <a:t>2/4/25</a:t>
             </a:fld>
             <a:endParaRPr lang="en-US" dirty="0"/>
           </a:p>
@@ -6075,7 +6074,7 @@
           <a:p>
             <a:fld id="{48A87A34-81AB-432B-8DAE-1953F412C126}" type="datetimeFigureOut">
               <a:rPr lang="en-US" dirty="0"/>
-              <a:t>2/3/25</a:t>
+              <a:t>2/4/25</a:t>
             </a:fld>
             <a:endParaRPr lang="en-US" dirty="0"/>
           </a:p>
@@ -6790,7 +6789,7 @@
           <a:p>
             <a:fld id="{48A87A34-81AB-432B-8DAE-1953F412C126}" type="datetimeFigureOut">
               <a:rPr lang="en-US" dirty="0"/>
-              <a:t>2/3/25</a:t>
+              <a:t>2/4/25</a:t>
             </a:fld>
             <a:endParaRPr lang="en-US" dirty="0"/>
           </a:p>
@@ -6955,7 +6954,7 @@
           <a:p>
             <a:fld id="{48A87A34-81AB-432B-8DAE-1953F412C126}" type="datetimeFigureOut">
               <a:rPr lang="en-US" dirty="0"/>
-              <a:t>2/3/25</a:t>
+              <a:t>2/4/25</a:t>
             </a:fld>
             <a:endParaRPr lang="en-US" dirty="0"/>
           </a:p>
@@ -7130,7 +7129,7 @@
           <a:p>
             <a:fld id="{48A87A34-81AB-432B-8DAE-1953F412C126}" type="datetimeFigureOut">
               <a:rPr lang="en-US" dirty="0"/>
-              <a:t>2/3/25</a:t>
+              <a:t>2/4/25</a:t>
             </a:fld>
             <a:endParaRPr lang="en-US" dirty="0"/>
           </a:p>
@@ -7295,7 +7294,7 @@
           <a:p>
             <a:fld id="{48A87A34-81AB-432B-8DAE-1953F412C126}" type="datetimeFigureOut">
               <a:rPr lang="en-US" dirty="0"/>
-              <a:t>2/3/25</a:t>
+              <a:t>2/4/25</a:t>
             </a:fld>
             <a:endParaRPr lang="en-US" dirty="0"/>
           </a:p>
@@ -7540,7 +7539,7 @@
           <a:p>
             <a:fld id="{48A87A34-81AB-432B-8DAE-1953F412C126}" type="datetimeFigureOut">
               <a:rPr lang="en-US" dirty="0"/>
-              <a:t>2/3/25</a:t>
+              <a:t>2/4/25</a:t>
             </a:fld>
             <a:endParaRPr lang="en-US" dirty="0"/>
           </a:p>
@@ -7767,7 +7766,7 @@
           <a:p>
             <a:fld id="{48A87A34-81AB-432B-8DAE-1953F412C126}" type="datetimeFigureOut">
               <a:rPr lang="en-US" dirty="0"/>
-              <a:t>2/3/25</a:t>
+              <a:t>2/4/25</a:t>
             </a:fld>
             <a:endParaRPr lang="en-US" dirty="0"/>
           </a:p>
@@ -8143,7 +8142,7 @@
           <a:p>
             <a:fld id="{48A87A34-81AB-432B-8DAE-1953F412C126}" type="datetimeFigureOut">
               <a:rPr lang="en-US" dirty="0"/>
-              <a:t>2/3/25</a:t>
+              <a:t>2/4/25</a:t>
             </a:fld>
             <a:endParaRPr lang="en-US" dirty="0"/>
           </a:p>
@@ -8256,7 +8255,7 @@
           <a:p>
             <a:fld id="{48A87A34-81AB-432B-8DAE-1953F412C126}" type="datetimeFigureOut">
               <a:rPr lang="en-US" dirty="0"/>
-              <a:t>2/3/25</a:t>
+              <a:t>2/4/25</a:t>
             </a:fld>
             <a:endParaRPr lang="en-US" dirty="0"/>
           </a:p>
@@ -8346,7 +8345,7 @@
           <a:p>
             <a:fld id="{48A87A34-81AB-432B-8DAE-1953F412C126}" type="datetimeFigureOut">
               <a:rPr lang="en-US" dirty="0"/>
-              <a:t>2/3/25</a:t>
+              <a:t>2/4/25</a:t>
             </a:fld>
             <a:endParaRPr lang="en-US" dirty="0"/>
           </a:p>
@@ -8590,7 +8589,7 @@
           <a:p>
             <a:fld id="{48A87A34-81AB-432B-8DAE-1953F412C126}" type="datetimeFigureOut">
               <a:rPr lang="en-US" dirty="0"/>
-              <a:t>2/3/25</a:t>
+              <a:t>2/4/25</a:t>
             </a:fld>
             <a:endParaRPr lang="en-US" dirty="0"/>
           </a:p>
@@ -8865,7 +8864,7 @@
           <a:p>
             <a:fld id="{48A87A34-81AB-432B-8DAE-1953F412C126}" type="datetimeFigureOut">
               <a:rPr lang="en-US" dirty="0"/>
-              <a:t>2/3/25</a:t>
+              <a:t>2/4/25</a:t>
             </a:fld>
             <a:endParaRPr lang="en-US" dirty="0"/>
           </a:p>
@@ -8976,7 +8975,7 @@
           <a:noFill/>
           <a:extLst>
             <a:ext uri="{909E8E84-426E-40dd-AFC4-6F175D3DCCD1}">
-              <a14:hiddenFill xmlns:a14="http://schemas.microsoft.com/office/drawing/2010/main" xmlns="">
+              <a14:hiddenFill xmlns="" xmlns:a14="http://schemas.microsoft.com/office/drawing/2010/main">
                 <a:solidFill>
                   <a:srgbClr val="FFFFFF"/>
                 </a:solidFill>
@@ -9050,7 +9049,7 @@
               </a:ln>
               <a:extLst>
                 <a:ext uri="{91240B29-F687-4f45-9708-019B960494DF}">
-                  <a14:hiddenLine xmlns:a14="http://schemas.microsoft.com/office/drawing/2010/main" xmlns="" w="9525">
+                  <a14:hiddenLine xmlns="" xmlns:a14="http://schemas.microsoft.com/office/drawing/2010/main" w="9525">
                     <a:solidFill>
                       <a:srgbClr val="000000"/>
                     </a:solidFill>
@@ -9140,7 +9139,7 @@
               </a:ln>
               <a:extLst>
                 <a:ext uri="{91240B29-F687-4f45-9708-019B960494DF}">
-                  <a14:hiddenLine xmlns:a14="http://schemas.microsoft.com/office/drawing/2010/main" xmlns="" w="9525">
+                  <a14:hiddenLine xmlns="" xmlns:a14="http://schemas.microsoft.com/office/drawing/2010/main" w="9525">
                     <a:solidFill>
                       <a:srgbClr val="000000"/>
                     </a:solidFill>
@@ -9230,7 +9229,7 @@
               </a:ln>
               <a:extLst>
                 <a:ext uri="{91240B29-F687-4f45-9708-019B960494DF}">
-                  <a14:hiddenLine xmlns:a14="http://schemas.microsoft.com/office/drawing/2010/main" xmlns="" w="9525">
+                  <a14:hiddenLine xmlns="" xmlns:a14="http://schemas.microsoft.com/office/drawing/2010/main" w="9525">
                     <a:solidFill>
                       <a:srgbClr val="000000"/>
                     </a:solidFill>
@@ -9292,7 +9291,7 @@
               </a:ln>
               <a:extLst>
                 <a:ext uri="{91240B29-F687-4f45-9708-019B960494DF}">
-                  <a14:hiddenLine xmlns:a14="http://schemas.microsoft.com/office/drawing/2010/main" xmlns="" w="9525">
+                  <a14:hiddenLine xmlns="" xmlns:a14="http://schemas.microsoft.com/office/drawing/2010/main" w="9525">
                     <a:solidFill>
                       <a:srgbClr val="000000"/>
                     </a:solidFill>
@@ -9382,7 +9381,7 @@
               </a:ln>
               <a:extLst>
                 <a:ext uri="{91240B29-F687-4f45-9708-019B960494DF}">
-                  <a14:hiddenLine xmlns:a14="http://schemas.microsoft.com/office/drawing/2010/main" xmlns="" w="9525">
+                  <a14:hiddenLine xmlns="" xmlns:a14="http://schemas.microsoft.com/office/drawing/2010/main" w="9525">
                     <a:solidFill>
                       <a:srgbClr val="000000"/>
                     </a:solidFill>
@@ -9444,7 +9443,7 @@
               </a:ln>
               <a:extLst>
                 <a:ext uri="{91240B29-F687-4f45-9708-019B960494DF}">
-                  <a14:hiddenLine xmlns:a14="http://schemas.microsoft.com/office/drawing/2010/main" xmlns="" w="9525">
+                  <a14:hiddenLine xmlns="" xmlns:a14="http://schemas.microsoft.com/office/drawing/2010/main" w="9525">
                     <a:solidFill>
                       <a:srgbClr val="000000"/>
                     </a:solidFill>
@@ -9506,7 +9505,7 @@
               </a:ln>
               <a:extLst>
                 <a:ext uri="{91240B29-F687-4f45-9708-019B960494DF}">
-                  <a14:hiddenLine xmlns:a14="http://schemas.microsoft.com/office/drawing/2010/main" xmlns="" w="9525">
+                  <a14:hiddenLine xmlns="" xmlns:a14="http://schemas.microsoft.com/office/drawing/2010/main" w="9525">
                     <a:solidFill>
                       <a:srgbClr val="000000"/>
                     </a:solidFill>
@@ -9596,7 +9595,7 @@
               </a:ln>
               <a:extLst>
                 <a:ext uri="{91240B29-F687-4f45-9708-019B960494DF}">
-                  <a14:hiddenLine xmlns:a14="http://schemas.microsoft.com/office/drawing/2010/main" xmlns="" w="9525">
+                  <a14:hiddenLine xmlns="" xmlns:a14="http://schemas.microsoft.com/office/drawing/2010/main" w="9525">
                     <a:solidFill>
                       <a:srgbClr val="000000"/>
                     </a:solidFill>
@@ -9686,7 +9685,7 @@
               </a:ln>
               <a:extLst>
                 <a:ext uri="{91240B29-F687-4f45-9708-019B960494DF}">
-                  <a14:hiddenLine xmlns:a14="http://schemas.microsoft.com/office/drawing/2010/main" xmlns="" w="9525">
+                  <a14:hiddenLine xmlns="" xmlns:a14="http://schemas.microsoft.com/office/drawing/2010/main" w="9525">
                     <a:solidFill>
                       <a:srgbClr val="000000"/>
                     </a:solidFill>
@@ -9748,7 +9747,7 @@
               </a:ln>
               <a:extLst>
                 <a:ext uri="{91240B29-F687-4f45-9708-019B960494DF}">
-                  <a14:hiddenLine xmlns:a14="http://schemas.microsoft.com/office/drawing/2010/main" xmlns="" w="9525">
+                  <a14:hiddenLine xmlns="" xmlns:a14="http://schemas.microsoft.com/office/drawing/2010/main" w="9525">
                     <a:solidFill>
                       <a:srgbClr val="000000"/>
                     </a:solidFill>
@@ -9858,7 +9857,7 @@
               </a:ln>
               <a:extLst>
                 <a:ext uri="{91240B29-F687-4f45-9708-019B960494DF}">
-                  <a14:hiddenLine xmlns:a14="http://schemas.microsoft.com/office/drawing/2010/main" xmlns="" w="9525">
+                  <a14:hiddenLine xmlns="" xmlns:a14="http://schemas.microsoft.com/office/drawing/2010/main" w="9525">
                     <a:solidFill>
                       <a:srgbClr val="000000"/>
                     </a:solidFill>
@@ -9942,7 +9941,7 @@
               </a:ln>
               <a:extLst>
                 <a:ext uri="{91240B29-F687-4f45-9708-019B960494DF}">
-                  <a14:hiddenLine xmlns:a14="http://schemas.microsoft.com/office/drawing/2010/main" xmlns="" w="9525">
+                  <a14:hiddenLine xmlns="" xmlns:a14="http://schemas.microsoft.com/office/drawing/2010/main" w="9525">
                     <a:solidFill>
                       <a:srgbClr val="000000"/>
                     </a:solidFill>
@@ -10004,7 +10003,7 @@
               </a:ln>
               <a:extLst>
                 <a:ext uri="{91240B29-F687-4f45-9708-019B960494DF}">
-                  <a14:hiddenLine xmlns:a14="http://schemas.microsoft.com/office/drawing/2010/main" xmlns="" w="9525">
+                  <a14:hiddenLine xmlns="" xmlns:a14="http://schemas.microsoft.com/office/drawing/2010/main" w="9525">
                     <a:solidFill>
                       <a:srgbClr val="000000"/>
                     </a:solidFill>
@@ -10066,7 +10065,7 @@
               </a:ln>
               <a:extLst>
                 <a:ext uri="{91240B29-F687-4f45-9708-019B960494DF}">
-                  <a14:hiddenLine xmlns:a14="http://schemas.microsoft.com/office/drawing/2010/main" xmlns="" w="9525">
+                  <a14:hiddenLine xmlns="" xmlns:a14="http://schemas.microsoft.com/office/drawing/2010/main" w="9525">
                     <a:solidFill>
                       <a:srgbClr val="000000"/>
                     </a:solidFill>
@@ -10156,7 +10155,7 @@
               </a:ln>
               <a:extLst>
                 <a:ext uri="{91240B29-F687-4f45-9708-019B960494DF}">
-                  <a14:hiddenLine xmlns:a14="http://schemas.microsoft.com/office/drawing/2010/main" xmlns="" w="9525">
+                  <a14:hiddenLine xmlns="" xmlns:a14="http://schemas.microsoft.com/office/drawing/2010/main" w="9525">
                     <a:solidFill>
                       <a:srgbClr val="000000"/>
                     </a:solidFill>
@@ -10190,7 +10189,7 @@
               </a:ln>
               <a:extLst>
                 <a:ext uri="{91240B29-F687-4f45-9708-019B960494DF}">
-                  <a14:hiddenLine xmlns:a14="http://schemas.microsoft.com/office/drawing/2010/main" xmlns="" w="9525">
+                  <a14:hiddenLine xmlns="" xmlns:a14="http://schemas.microsoft.com/office/drawing/2010/main" w="9525">
                     <a:solidFill>
                       <a:srgbClr val="000000"/>
                     </a:solidFill>
@@ -10255,7 +10254,7 @@
               </a:ln>
               <a:extLst>
                 <a:ext uri="{91240B29-F687-4f45-9708-019B960494DF}">
-                  <a14:hiddenLine xmlns:a14="http://schemas.microsoft.com/office/drawing/2010/main" xmlns="" w="9525">
+                  <a14:hiddenLine xmlns="" xmlns:a14="http://schemas.microsoft.com/office/drawing/2010/main" w="9525">
                     <a:solidFill>
                       <a:srgbClr val="000000"/>
                     </a:solidFill>
@@ -10345,7 +10344,7 @@
               </a:ln>
               <a:extLst>
                 <a:ext uri="{91240B29-F687-4f45-9708-019B960494DF}">
-                  <a14:hiddenLine xmlns:a14="http://schemas.microsoft.com/office/drawing/2010/main" xmlns="" w="9525">
+                  <a14:hiddenLine xmlns="" xmlns:a14="http://schemas.microsoft.com/office/drawing/2010/main" w="9525">
                     <a:solidFill>
                       <a:srgbClr val="000000"/>
                     </a:solidFill>
@@ -10407,7 +10406,7 @@
               </a:ln>
               <a:extLst>
                 <a:ext uri="{91240B29-F687-4f45-9708-019B960494DF}">
-                  <a14:hiddenLine xmlns:a14="http://schemas.microsoft.com/office/drawing/2010/main" xmlns="" w="9525">
+                  <a14:hiddenLine xmlns="" xmlns:a14="http://schemas.microsoft.com/office/drawing/2010/main" w="9525">
                     <a:solidFill>
                       <a:srgbClr val="000000"/>
                     </a:solidFill>
@@ -10497,7 +10496,7 @@
               </a:ln>
               <a:extLst>
                 <a:ext uri="{91240B29-F687-4f45-9708-019B960494DF}">
-                  <a14:hiddenLine xmlns:a14="http://schemas.microsoft.com/office/drawing/2010/main" xmlns="" w="9525">
+                  <a14:hiddenLine xmlns="" xmlns:a14="http://schemas.microsoft.com/office/drawing/2010/main" w="9525">
                     <a:solidFill>
                       <a:srgbClr val="000000"/>
                     </a:solidFill>
@@ -10562,7 +10561,7 @@
               </a:ln>
               <a:extLst>
                 <a:ext uri="{91240B29-F687-4f45-9708-019B960494DF}">
-                  <a14:hiddenLine xmlns:a14="http://schemas.microsoft.com/office/drawing/2010/main" xmlns="" w="9525">
+                  <a14:hiddenLine xmlns="" xmlns:a14="http://schemas.microsoft.com/office/drawing/2010/main" w="9525">
                     <a:solidFill>
                       <a:srgbClr val="000000"/>
                     </a:solidFill>
@@ -10624,7 +10623,7 @@
               </a:ln>
               <a:extLst>
                 <a:ext uri="{91240B29-F687-4f45-9708-019B960494DF}">
-                  <a14:hiddenLine xmlns:a14="http://schemas.microsoft.com/office/drawing/2010/main" xmlns="" w="9525">
+                  <a14:hiddenLine xmlns="" xmlns:a14="http://schemas.microsoft.com/office/drawing/2010/main" w="9525">
                     <a:solidFill>
                       <a:srgbClr val="000000"/>
                     </a:solidFill>
@@ -10714,7 +10713,7 @@
               </a:ln>
               <a:extLst>
                 <a:ext uri="{91240B29-F687-4f45-9708-019B960494DF}">
-                  <a14:hiddenLine xmlns:a14="http://schemas.microsoft.com/office/drawing/2010/main" xmlns="" w="9525">
+                  <a14:hiddenLine xmlns="" xmlns:a14="http://schemas.microsoft.com/office/drawing/2010/main" w="9525">
                     <a:solidFill>
                       <a:srgbClr val="000000"/>
                     </a:solidFill>
@@ -10804,7 +10803,7 @@
               </a:ln>
               <a:extLst>
                 <a:ext uri="{91240B29-F687-4f45-9708-019B960494DF}">
-                  <a14:hiddenLine xmlns:a14="http://schemas.microsoft.com/office/drawing/2010/main" xmlns="" w="9525">
+                  <a14:hiddenLine xmlns="" xmlns:a14="http://schemas.microsoft.com/office/drawing/2010/main" w="9525">
                     <a:solidFill>
                       <a:srgbClr val="000000"/>
                     </a:solidFill>
@@ -10869,7 +10868,7 @@
               </a:ln>
               <a:extLst>
                 <a:ext uri="{91240B29-F687-4f45-9708-019B960494DF}">
-                  <a14:hiddenLine xmlns:a14="http://schemas.microsoft.com/office/drawing/2010/main" xmlns="" w="9525">
+                  <a14:hiddenLine xmlns="" xmlns:a14="http://schemas.microsoft.com/office/drawing/2010/main" w="9525">
                     <a:solidFill>
                       <a:srgbClr val="000000"/>
                     </a:solidFill>
@@ -10989,7 +10988,7 @@
               </a:ln>
               <a:extLst>
                 <a:ext uri="{91240B29-F687-4f45-9708-019B960494DF}">
-                  <a14:hiddenLine xmlns:a14="http://schemas.microsoft.com/office/drawing/2010/main" xmlns="" w="9525">
+                  <a14:hiddenLine xmlns="" xmlns:a14="http://schemas.microsoft.com/office/drawing/2010/main" w="9525">
                     <a:solidFill>
                       <a:srgbClr val="000000"/>
                     </a:solidFill>
@@ -11087,7 +11086,7 @@
               </a:ln>
               <a:extLst>
                 <a:ext uri="{91240B29-F687-4f45-9708-019B960494DF}">
-                  <a14:hiddenLine xmlns:a14="http://schemas.microsoft.com/office/drawing/2010/main" xmlns="" w="9525">
+                  <a14:hiddenLine xmlns="" xmlns:a14="http://schemas.microsoft.com/office/drawing/2010/main" w="9525">
                     <a:solidFill>
                       <a:srgbClr val="000000"/>
                     </a:solidFill>
@@ -11202,7 +11201,7 @@
               </a:ln>
               <a:extLst>
                 <a:ext uri="{91240B29-F687-4f45-9708-019B960494DF}">
-                  <a14:hiddenLine xmlns:a14="http://schemas.microsoft.com/office/drawing/2010/main" xmlns="" w="9525">
+                  <a14:hiddenLine xmlns="" xmlns:a14="http://schemas.microsoft.com/office/drawing/2010/main" w="9525">
                     <a:solidFill>
                       <a:srgbClr val="000000"/>
                     </a:solidFill>
@@ -11292,7 +11291,7 @@
               </a:ln>
               <a:extLst>
                 <a:ext uri="{91240B29-F687-4f45-9708-019B960494DF}">
-                  <a14:hiddenLine xmlns:a14="http://schemas.microsoft.com/office/drawing/2010/main" xmlns="" w="9525">
+                  <a14:hiddenLine xmlns="" xmlns:a14="http://schemas.microsoft.com/office/drawing/2010/main" w="9525">
                     <a:solidFill>
                       <a:srgbClr val="000000"/>
                     </a:solidFill>
@@ -11357,7 +11356,7 @@
               </a:ln>
               <a:extLst>
                 <a:ext uri="{91240B29-F687-4f45-9708-019B960494DF}">
-                  <a14:hiddenLine xmlns:a14="http://schemas.microsoft.com/office/drawing/2010/main" xmlns="" w="9525">
+                  <a14:hiddenLine xmlns="" xmlns:a14="http://schemas.microsoft.com/office/drawing/2010/main" w="9525">
                     <a:solidFill>
                       <a:srgbClr val="000000"/>
                     </a:solidFill>
@@ -11447,7 +11446,7 @@
               </a:ln>
               <a:extLst>
                 <a:ext uri="{91240B29-F687-4f45-9708-019B960494DF}">
-                  <a14:hiddenLine xmlns:a14="http://schemas.microsoft.com/office/drawing/2010/main" xmlns="" w="9525">
+                  <a14:hiddenLine xmlns="" xmlns:a14="http://schemas.microsoft.com/office/drawing/2010/main" w="9525">
                     <a:solidFill>
                       <a:srgbClr val="000000"/>
                     </a:solidFill>
@@ -11515,7 +11514,7 @@
               </a:ln>
               <a:extLst>
                 <a:ext uri="{91240B29-F687-4f45-9708-019B960494DF}">
-                  <a14:hiddenLine xmlns:a14="http://schemas.microsoft.com/office/drawing/2010/main" xmlns="" w="9525">
+                  <a14:hiddenLine xmlns="" xmlns:a14="http://schemas.microsoft.com/office/drawing/2010/main" w="9525">
                     <a:solidFill>
                       <a:srgbClr val="000000"/>
                     </a:solidFill>
@@ -11605,7 +11604,7 @@
               </a:ln>
               <a:extLst>
                 <a:ext uri="{91240B29-F687-4f45-9708-019B960494DF}">
-                  <a14:hiddenLine xmlns:a14="http://schemas.microsoft.com/office/drawing/2010/main" xmlns="" w="9525">
+                  <a14:hiddenLine xmlns="" xmlns:a14="http://schemas.microsoft.com/office/drawing/2010/main" w="9525">
                     <a:solidFill>
                       <a:srgbClr val="000000"/>
                     </a:solidFill>
@@ -11673,7 +11672,7 @@
               </a:ln>
               <a:extLst>
                 <a:ext uri="{91240B29-F687-4f45-9708-019B960494DF}">
-                  <a14:hiddenLine xmlns:a14="http://schemas.microsoft.com/office/drawing/2010/main" xmlns="" w="9525">
+                  <a14:hiddenLine xmlns="" xmlns:a14="http://schemas.microsoft.com/office/drawing/2010/main" w="9525">
                     <a:solidFill>
                       <a:srgbClr val="000000"/>
                     </a:solidFill>
@@ -11763,7 +11762,7 @@
               </a:ln>
               <a:extLst>
                 <a:ext uri="{91240B29-F687-4f45-9708-019B960494DF}">
-                  <a14:hiddenLine xmlns:a14="http://schemas.microsoft.com/office/drawing/2010/main" xmlns="" w="9525">
+                  <a14:hiddenLine xmlns="" xmlns:a14="http://schemas.microsoft.com/office/drawing/2010/main" w="9525">
                     <a:solidFill>
                       <a:srgbClr val="000000"/>
                     </a:solidFill>
@@ -11797,7 +11796,7 @@
               </a:ln>
               <a:extLst>
                 <a:ext uri="{91240B29-F687-4f45-9708-019B960494DF}">
-                  <a14:hiddenLine xmlns:a14="http://schemas.microsoft.com/office/drawing/2010/main" xmlns="" w="9525">
+                  <a14:hiddenLine xmlns="" xmlns:a14="http://schemas.microsoft.com/office/drawing/2010/main" w="9525">
                     <a:solidFill>
                       <a:srgbClr val="000000"/>
                     </a:solidFill>
@@ -11938,7 +11937,7 @@
             <a:fld id="{48A87A34-81AB-432B-8DAE-1953F412C126}" type="datetimeFigureOut">
               <a:rPr lang="en-US" dirty="0"/>
               <a:pPr/>
-              <a:t>2/3/25</a:t>
+              <a:t>2/4/25</a:t>
             </a:fld>
             <a:endParaRPr lang="en-US" dirty="0"/>
           </a:p>
@@ -12522,7 +12521,7 @@
             <a:noFill/>
             <a:extLst>
               <a:ext uri="{909E8E84-426E-40dd-AFC4-6F175D3DCCD1}">
-                <a14:hiddenFill xmlns="" xmlns:a16="http://schemas.microsoft.com/office/drawing/2014/main" xmlns:a14="http://schemas.microsoft.com/office/drawing/2010/main" xmlns:p14="http://schemas.microsoft.com/office/powerpoint/2010/main">
+                <a14:hiddenFill xmlns:p14="http://schemas.microsoft.com/office/powerpoint/2010/main" xmlns:a14="http://schemas.microsoft.com/office/drawing/2010/main" xmlns:a16="http://schemas.microsoft.com/office/drawing/2014/main" xmlns="">
                   <a:solidFill>
                     <a:srgbClr val="FFFFFF"/>
                   </a:solidFill>
@@ -14858,7 +14857,9 @@
           </a:xfrm>
         </p:spPr>
         <p:txBody>
-          <a:bodyPr/>
+          <a:bodyPr>
+            <a:normAutofit fontScale="92500" lnSpcReduction="20000"/>
+          </a:bodyPr>
           <a:lstStyle/>
           <a:p>
             <a:r>
@@ -14872,6 +14873,27 @@
               </a:rPr>
               <a:t>The goal of this project is to provide a comprehensive data visualization of global climate change and its overall impact. To conduct this analysis, we first gathered data from the International Monetary Fund and the World Health Organization, compiling a dataset that includes temperature changes, CO₂ emissions, sea level variations, climate-related disasters, and pollution-related illnesses.</a:t>
             </a:r>
+          </a:p>
+          <a:p>
+            <a:r>
+              <a:rPr lang="en-US" b="0" i="0" dirty="0">
+                <a:solidFill>
+                  <a:srgbClr val="212529"/>
+                </a:solidFill>
+                <a:effectLst/>
+                <a:latin typeface="Abadi MT Condensed Light" panose="020B0306030101010103" pitchFamily="34" charset="77"/>
+                <a:cs typeface="Arial" panose="020B0604020202020204" pitchFamily="34" charset="0"/>
+              </a:rPr>
+              <a:t>After assembling our datasets, we utilized JavaScript to develop interactive visualizations that illustrate trends in global climate change over time. This site showcases these visualizations, along with detailed explanations and insights into significant patterns and trends observed in the data.</a:t>
+            </a:r>
+            <a:endParaRPr lang="en-US" b="0" i="0" dirty="0">
+              <a:solidFill>
+                <a:srgbClr val="212529"/>
+              </a:solidFill>
+              <a:effectLst/>
+              <a:latin typeface="Abadi MT Condensed Light" panose="020B0306030101010103" pitchFamily="34" charset="77"/>
+              <a:cs typeface="Damascus" pitchFamily="2" charset="-78"/>
+            </a:endParaRPr>
           </a:p>
           <a:p>
             <a:pPr marL="0" indent="0">
@@ -14965,103 +14987,6 @@
           <p:cNvPr id="2" name="Title 1">
             <a:extLst>
               <a:ext uri="{FF2B5EF4-FFF2-40B4-BE49-F238E27FC236}">
-                <a16:creationId xmlns:a16="http://schemas.microsoft.com/office/drawing/2014/main" id="{2D9AAE85-ED45-9108-A397-BA1D5045F07E}"/>
-              </a:ext>
-            </a:extLst>
-          </p:cNvPr>
-          <p:cNvSpPr>
-            <a:spLocks noGrp="1"/>
-          </p:cNvSpPr>
-          <p:nvPr>
-            <p:ph type="title"/>
-          </p:nvPr>
-        </p:nvSpPr>
-        <p:spPr/>
-        <p:txBody>
-          <a:bodyPr/>
-          <a:lstStyle/>
-          <a:p>
-            <a:r>
-              <a:rPr lang="en-US" dirty="0"/>
-              <a:t>Website overview</a:t>
-            </a:r>
-          </a:p>
-        </p:txBody>
-      </p:sp>
-      <p:sp>
-        <p:nvSpPr>
-          <p:cNvPr id="3" name="Content Placeholder 2">
-            <a:extLst>
-              <a:ext uri="{FF2B5EF4-FFF2-40B4-BE49-F238E27FC236}">
-                <a16:creationId xmlns:a16="http://schemas.microsoft.com/office/drawing/2014/main" id="{B70F07F2-B872-FC7E-A836-CB4103D67BD8}"/>
-              </a:ext>
-            </a:extLst>
-          </p:cNvPr>
-          <p:cNvSpPr>
-            <a:spLocks noGrp="1"/>
-          </p:cNvSpPr>
-          <p:nvPr>
-            <p:ph idx="1"/>
-          </p:nvPr>
-        </p:nvSpPr>
-        <p:spPr/>
-        <p:txBody>
-          <a:bodyPr/>
-          <a:lstStyle/>
-          <a:p>
-            <a:r>
-              <a:rPr lang="en-US" b="0" i="0" dirty="0">
-                <a:solidFill>
-                  <a:srgbClr val="212529"/>
-                </a:solidFill>
-                <a:effectLst/>
-                <a:latin typeface="Abadi MT Condensed Light" panose="020B0306030101010103" pitchFamily="34" charset="77"/>
-                <a:cs typeface="Arial" panose="020B0604020202020204" pitchFamily="34" charset="0"/>
-              </a:rPr>
-              <a:t>After assembling our datasets, we utilized JavaScript to develop interactive visualizations that illustrate trends in global climate change over time. This site showcases these visualizations, along with detailed explanations and insights into significant patterns and trends observed in the data.</a:t>
-            </a:r>
-            <a:endParaRPr lang="en-US" dirty="0">
-              <a:latin typeface="Abadi MT Condensed Light" panose="020B0306030101010103" pitchFamily="34" charset="77"/>
-              <a:cs typeface="Arial" panose="020B0604020202020204" pitchFamily="34" charset="0"/>
-            </a:endParaRPr>
-          </a:p>
-        </p:txBody>
-      </p:sp>
-    </p:spTree>
-    <p:extLst>
-      <p:ext uri="{BB962C8B-B14F-4D97-AF65-F5344CB8AC3E}">
-        <p14:creationId xmlns:p14="http://schemas.microsoft.com/office/powerpoint/2010/main" val="3602437020"/>
-      </p:ext>
-    </p:extLst>
-  </p:cSld>
-  <p:clrMapOvr>
-    <a:masterClrMapping/>
-  </p:clrMapOvr>
-</p:sld>
-</file>
-
-<file path=ppt/slides/slide4.xml><?xml version="1.0" encoding="utf-8"?>
-<p:sld xmlns:a="http://schemas.openxmlformats.org/drawingml/2006/main" xmlns:r="http://schemas.openxmlformats.org/officeDocument/2006/relationships" xmlns:p="http://schemas.openxmlformats.org/presentationml/2006/main">
-  <p:cSld>
-    <p:spTree>
-      <p:nvGrpSpPr>
-        <p:cNvPr id="1" name=""/>
-        <p:cNvGrpSpPr/>
-        <p:nvPr/>
-      </p:nvGrpSpPr>
-      <p:grpSpPr>
-        <a:xfrm>
-          <a:off x="0" y="0"/>
-          <a:ext cx="0" cy="0"/>
-          <a:chOff x="0" y="0"/>
-          <a:chExt cx="0" cy="0"/>
-        </a:xfrm>
-      </p:grpSpPr>
-      <p:sp>
-        <p:nvSpPr>
-          <p:cNvPr id="2" name="Title 1">
-            <a:extLst>
-              <a:ext uri="{FF2B5EF4-FFF2-40B4-BE49-F238E27FC236}">
                 <a16:creationId xmlns:a16="http://schemas.microsoft.com/office/drawing/2014/main" id="{ECD4761F-7836-44AD-1392-345DB7EC4E23}"/>
               </a:ext>
             </a:extLst>
@@ -15133,7 +15058,7 @@
                 <a:latin typeface="Abadi MT Condensed Light" panose="020B0306030101010103" pitchFamily="34" charset="77"/>
                 <a:cs typeface="Arial" panose="020B0604020202020204" pitchFamily="34" charset="0"/>
               </a:rPr>
-              <a:t>Within each visualization, you can select a different visualization or you can select the home button to bring it back to the homepage</a:t>
+              <a:t>Within each visualization, you can select a different visualization, or you can select the home button to bring it back to the homepage</a:t>
             </a:r>
           </a:p>
           <a:p>
@@ -15228,7 +15153,7 @@
 </p:sld>
 </file>
 
-<file path=ppt/slides/slide5.xml><?xml version="1.0" encoding="utf-8"?>
+<file path=ppt/slides/slide4.xml><?xml version="1.0" encoding="utf-8"?>
 <p:sld xmlns:a="http://schemas.openxmlformats.org/drawingml/2006/main" xmlns:r="http://schemas.openxmlformats.org/officeDocument/2006/relationships" xmlns:p="http://schemas.openxmlformats.org/presentationml/2006/main">
   <p:cSld>
     <p:spTree>
@@ -15365,7 +15290,7 @@
 </p:sld>
 </file>
 
-<file path=ppt/slides/slide6.xml><?xml version="1.0" encoding="utf-8"?>
+<file path=ppt/slides/slide5.xml><?xml version="1.0" encoding="utf-8"?>
 <p:sld xmlns:a="http://schemas.openxmlformats.org/drawingml/2006/main" xmlns:r="http://schemas.openxmlformats.org/officeDocument/2006/relationships" xmlns:p="http://schemas.openxmlformats.org/presentationml/2006/main">
   <p:cSld>
     <p:spTree>
@@ -15456,42 +15381,6 @@
               <a:cs typeface="Arial" panose="020B0604020202020204" pitchFamily="34" charset="0"/>
             </a:endParaRPr>
           </a:p>
-          <a:p>
-            <a:r>
-              <a:rPr lang="en-US" sz="2200" dirty="0">
-                <a:solidFill>
-                  <a:schemeClr val="bg1"/>
-                </a:solidFill>
-                <a:latin typeface="Abadi MT Condensed Light" panose="020B0306030101010103" pitchFamily="34" charset="77"/>
-                <a:cs typeface="Arial" panose="020B0604020202020204" pitchFamily="34" charset="0"/>
-              </a:rPr>
-              <a:t>Exploring the link between the frequency of natural disasters, rising sea levels, rising temperatures with climate change and how it affects the population</a:t>
-            </a:r>
-          </a:p>
-          <a:p>
-            <a:r>
-              <a:rPr lang="en-US" sz="2200" dirty="0">
-                <a:solidFill>
-                  <a:schemeClr val="bg1"/>
-                </a:solidFill>
-                <a:latin typeface="Abadi MT Condensed Light" panose="020B0306030101010103" pitchFamily="34" charset="77"/>
-                <a:cs typeface="Arial" panose="020B0604020202020204" pitchFamily="34" charset="0"/>
-              </a:rPr>
-              <a:t>These indicators focus on examining the correlation between carbon dioxide atmospheric concentrations and trends in global warming</a:t>
-            </a:r>
-          </a:p>
-          <a:p>
-            <a:r>
-              <a:rPr lang="en-US" sz="2200" dirty="0">
-                <a:solidFill>
-                  <a:schemeClr val="bg1"/>
-                </a:solidFill>
-                <a:latin typeface="Abadi MT Condensed Light" panose="020B0306030101010103" pitchFamily="34" charset="77"/>
-                <a:cs typeface="Arial" panose="020B0604020202020204" pitchFamily="34" charset="0"/>
-              </a:rPr>
-              <a:t>Findings are documented annually</a:t>
-            </a:r>
-          </a:p>
         </p:txBody>
       </p:sp>
     </p:spTree>
@@ -15507,7 +15396,7 @@
 </p:sld>
 </file>
 
-<file path=ppt/slides/slide7.xml><?xml version="1.0" encoding="utf-8"?>
+<file path=ppt/slides/slide6.xml><?xml version="1.0" encoding="utf-8"?>
 <p:sld xmlns:a="http://schemas.openxmlformats.org/drawingml/2006/main" xmlns:r="http://schemas.openxmlformats.org/officeDocument/2006/relationships" xmlns:p="http://schemas.openxmlformats.org/presentationml/2006/main">
   <p:cSld>
     <p:spTree>
@@ -15640,167 +15529,67 @@
                   </a:extLst>
                 </a:hlinkClick>
               </a:rPr>
-              <a:t>https://www.who.int/data/gho/data/themes/air-pollution/total-burden-of-disease-from-household-and-ambient-air-pollution</a:t>
-            </a:r>
-            <a:endParaRPr lang="en-US" sz="1800" u="sng" kern="100" dirty="0">
-              <a:solidFill>
-                <a:schemeClr val="bg1"/>
-              </a:solidFill>
-              <a:effectLst/>
-              <a:latin typeface="Abadi MT Condensed Light" panose="020B0306030101010103" pitchFamily="34" charset="77"/>
-              <a:ea typeface="Aptos" panose="020B0004020202020204" pitchFamily="34" charset="0"/>
-              <a:cs typeface="Arial" panose="020B0604020202020204" pitchFamily="34" charset="0"/>
-            </a:endParaRPr>
-          </a:p>
-          <a:p>
-            <a:pPr marL="342900" marR="0" lvl="0" indent="-342900">
-              <a:spcBef>
-                <a:spcPts val="0"/>
-              </a:spcBef>
-              <a:spcAft>
-                <a:spcPts val="0"/>
-              </a:spcAft>
-              <a:buFont typeface="Symbol" pitchFamily="2" charset="2"/>
-              <a:buChar char=""/>
-            </a:pPr>
-            <a:r>
-              <a:rPr lang="en-US" sz="1800" kern="100" dirty="0">
-                <a:solidFill>
-                  <a:schemeClr val="bg1"/>
-                </a:solidFill>
-                <a:effectLst/>
-                <a:latin typeface="Abadi MT Condensed Light" panose="020B0306030101010103" pitchFamily="34" charset="77"/>
-                <a:ea typeface="Aptos" panose="020B0004020202020204" pitchFamily="34" charset="0"/>
-                <a:cs typeface="Arial" panose="020B0604020202020204" pitchFamily="34" charset="0"/>
-              </a:rPr>
-              <a:t>https://</a:t>
-            </a:r>
-            <a:r>
-              <a:rPr lang="en-US" sz="1800" kern="100" dirty="0" err="1">
-                <a:solidFill>
-                  <a:schemeClr val="bg1"/>
-                </a:solidFill>
-                <a:effectLst/>
-                <a:latin typeface="Abadi MT Condensed Light" panose="020B0306030101010103" pitchFamily="34" charset="77"/>
-                <a:ea typeface="Aptos" panose="020B0004020202020204" pitchFamily="34" charset="0"/>
-                <a:cs typeface="Arial" panose="020B0604020202020204" pitchFamily="34" charset="0"/>
-              </a:rPr>
-              <a:t>www.star.nesdis.noaa.gov</a:t>
+              <a:t>https://www.who.int/data/gho/data/themes/air-pollution/</a:t>
             </a:r>
             <a:r>
               <a:rPr lang="en-US" sz="1800" kern="100" dirty="0">
                 <a:solidFill>
                   <a:schemeClr val="bg1"/>
                 </a:solidFill>
-                <a:effectLst/>
                 <a:latin typeface="Abadi MT Condensed Light" panose="020B0306030101010103" pitchFamily="34" charset="77"/>
-                <a:ea typeface="Aptos" panose="020B0004020202020204" pitchFamily="34" charset="0"/>
                 <a:cs typeface="Arial" panose="020B0604020202020204" pitchFamily="34" charset="0"/>
+                <a:hlinkClick r:id="rId3">
+                  <a:extLst>
+                    <a:ext uri="{A12FA001-AC4F-418D-AE19-62706E023703}">
+                      <ahyp:hlinkClr xmlns:ahyp="http://schemas.microsoft.com/office/drawing/2018/hyperlinkcolor" val="tx"/>
+                    </a:ext>
+                  </a:extLst>
+                </a:hlinkClick>
               </a:rPr>
-              <a:t>/</a:t>
-            </a:r>
-            <a:r>
-              <a:rPr lang="en-US" sz="1800" kern="100" dirty="0" err="1">
-                <a:solidFill>
-                  <a:schemeClr val="bg1"/>
-                </a:solidFill>
-                <a:effectLst/>
-                <a:latin typeface="Abadi MT Condensed Light" panose="020B0306030101010103" pitchFamily="34" charset="77"/>
-                <a:ea typeface="Aptos" panose="020B0004020202020204" pitchFamily="34" charset="0"/>
-                <a:cs typeface="Arial" panose="020B0604020202020204" pitchFamily="34" charset="0"/>
-              </a:rPr>
-              <a:t>socd</a:t>
-            </a:r>
-            <a:r>
-              <a:rPr lang="en-US" sz="1800" kern="100" dirty="0">
-                <a:solidFill>
-                  <a:schemeClr val="bg1"/>
-                </a:solidFill>
-                <a:effectLst/>
-                <a:latin typeface="Abadi MT Condensed Light" panose="020B0306030101010103" pitchFamily="34" charset="77"/>
-                <a:ea typeface="Aptos" panose="020B0004020202020204" pitchFamily="34" charset="0"/>
-                <a:cs typeface="Arial" panose="020B0604020202020204" pitchFamily="34" charset="0"/>
-              </a:rPr>
-              <a:t>/</a:t>
-            </a:r>
-            <a:r>
-              <a:rPr lang="en-US" sz="1800" kern="100" dirty="0" err="1">
-                <a:solidFill>
-                  <a:schemeClr val="bg1"/>
-                </a:solidFill>
-                <a:effectLst/>
-                <a:latin typeface="Abadi MT Condensed Light" panose="020B0306030101010103" pitchFamily="34" charset="77"/>
-                <a:ea typeface="Aptos" panose="020B0004020202020204" pitchFamily="34" charset="0"/>
-                <a:cs typeface="Arial" panose="020B0604020202020204" pitchFamily="34" charset="0"/>
-              </a:rPr>
-              <a:t>lsa</a:t>
-            </a:r>
-            <a:r>
-              <a:rPr lang="en-US" sz="1800" kern="100" dirty="0">
-                <a:solidFill>
-                  <a:schemeClr val="bg1"/>
-                </a:solidFill>
-                <a:effectLst/>
-                <a:latin typeface="Abadi MT Condensed Light" panose="020B0306030101010103" pitchFamily="34" charset="77"/>
-                <a:ea typeface="Aptos" panose="020B0004020202020204" pitchFamily="34" charset="0"/>
-                <a:cs typeface="Arial" panose="020B0604020202020204" pitchFamily="34" charset="0"/>
-              </a:rPr>
-              <a:t>/</a:t>
-            </a:r>
-            <a:r>
-              <a:rPr lang="en-US" sz="1800" kern="100" dirty="0" err="1">
-                <a:solidFill>
-                  <a:schemeClr val="bg1"/>
-                </a:solidFill>
-                <a:effectLst/>
-                <a:latin typeface="Abadi MT Condensed Light" panose="020B0306030101010103" pitchFamily="34" charset="77"/>
-                <a:ea typeface="Aptos" panose="020B0004020202020204" pitchFamily="34" charset="0"/>
-                <a:cs typeface="Arial" panose="020B0604020202020204" pitchFamily="34" charset="0"/>
-              </a:rPr>
-              <a:t>SeaLevelRise</a:t>
-            </a:r>
-            <a:r>
-              <a:rPr lang="en-US" sz="1800" kern="100" dirty="0">
-                <a:solidFill>
-                  <a:schemeClr val="bg1"/>
-                </a:solidFill>
-                <a:effectLst/>
-                <a:latin typeface="Abadi MT Condensed Light" panose="020B0306030101010103" pitchFamily="34" charset="77"/>
-                <a:ea typeface="Aptos" panose="020B0004020202020204" pitchFamily="34" charset="0"/>
-                <a:cs typeface="Arial" panose="020B0604020202020204" pitchFamily="34" charset="0"/>
-              </a:rPr>
-              <a:t>/</a:t>
-            </a:r>
-            <a:r>
-              <a:rPr lang="en-US" sz="1800" kern="100" dirty="0" err="1">
-                <a:solidFill>
-                  <a:schemeClr val="bg1"/>
-                </a:solidFill>
-                <a:effectLst/>
-                <a:latin typeface="Abadi MT Condensed Light" panose="020B0306030101010103" pitchFamily="34" charset="77"/>
-                <a:ea typeface="Aptos" panose="020B0004020202020204" pitchFamily="34" charset="0"/>
-                <a:cs typeface="Arial" panose="020B0604020202020204" pitchFamily="34" charset="0"/>
-              </a:rPr>
-              <a:t>LSA_SLR_timeseries.php</a:t>
+              <a:t>total-burden-of-disease-from-household-and-ambient-air-pollution</a:t>
             </a:r>
             <a:endParaRPr lang="en-US" sz="1800" kern="100" dirty="0">
               <a:solidFill>
                 <a:schemeClr val="bg1"/>
               </a:solidFill>
-              <a:effectLst/>
               <a:latin typeface="Abadi MT Condensed Light" panose="020B0306030101010103" pitchFamily="34" charset="77"/>
-              <a:ea typeface="Aptos" panose="020B0004020202020204" pitchFamily="34" charset="0"/>
               <a:cs typeface="Arial" panose="020B0604020202020204" pitchFamily="34" charset="0"/>
             </a:endParaRPr>
           </a:p>
           <a:p>
+            <a:pPr marL="800100" lvl="1" indent="-342900">
+              <a:spcBef>
+                <a:spcPts val="0"/>
+              </a:spcBef>
+              <a:buFont typeface="Symbol" pitchFamily="2" charset="2"/>
+              <a:buChar char=""/>
+            </a:pPr>
             <a:r>
-              <a:rPr lang="en-US" sz="1800" b="0" i="0" u="sng" dirty="0">
+              <a:rPr lang="en-US" sz="1400" u="sng" kern="100" dirty="0">
                 <a:solidFill>
                   <a:schemeClr val="bg1"/>
                 </a:solidFill>
-                <a:effectLst/>
                 <a:latin typeface="Abadi MT Condensed Light" panose="020B0306030101010103" pitchFamily="34" charset="77"/>
+                <a:cs typeface="Arial" panose="020B0604020202020204" pitchFamily="34" charset="0"/>
+              </a:rPr>
+              <a:t>https://www.star.nesdis.noaa.gov/socd/lsa/SeaLevelRise/LSA_SLR_timeseries.php</a:t>
+            </a:r>
+          </a:p>
+          <a:p>
+            <a:pPr marL="800100" lvl="1" indent="-342900">
+              <a:spcBef>
+                <a:spcPts val="0"/>
+              </a:spcBef>
+              <a:buFont typeface="Symbol" pitchFamily="2" charset="2"/>
+              <a:buChar char=""/>
+            </a:pPr>
+            <a:r>
+              <a:rPr lang="en-US" sz="1400" kern="100" dirty="0">
+                <a:solidFill>
+                  <a:schemeClr val="bg1"/>
+                </a:solidFill>
+                <a:latin typeface="Abadi MT Condensed Light" panose="020B0306030101010103" pitchFamily="34" charset="77"/>
+                <a:cs typeface="Arial" panose="020B0604020202020204" pitchFamily="34" charset="0"/>
                 <a:hlinkClick r:id="rId4">
                   <a:extLst>
                     <a:ext uri="{A12FA001-AC4F-418D-AE19-62706E023703}">
@@ -15811,20 +15600,29 @@
               </a:rPr>
               <a:t>https://opencagedata.com/</a:t>
             </a:r>
-            <a:endParaRPr lang="en-US" sz="1800" u="sng" dirty="0">
+            <a:endParaRPr lang="en-US" sz="1400" kern="100" dirty="0">
               <a:solidFill>
                 <a:schemeClr val="bg1"/>
               </a:solidFill>
               <a:latin typeface="Abadi MT Condensed Light" panose="020B0306030101010103" pitchFamily="34" charset="77"/>
+              <a:cs typeface="Arial" panose="020B0604020202020204" pitchFamily="34" charset="0"/>
             </a:endParaRPr>
           </a:p>
           <a:p>
+            <a:pPr marL="800100" lvl="1" indent="-342900">
+              <a:spcBef>
+                <a:spcPts val="0"/>
+              </a:spcBef>
+              <a:buFont typeface="Symbol" pitchFamily="2" charset="2"/>
+              <a:buChar char=""/>
+            </a:pPr>
             <a:r>
-              <a:rPr lang="en-US" sz="1800" dirty="0">
+              <a:rPr lang="en-US" sz="1400" kern="100" dirty="0">
                 <a:solidFill>
                   <a:schemeClr val="bg1"/>
                 </a:solidFill>
                 <a:latin typeface="Abadi MT Condensed Light" panose="020B0306030101010103" pitchFamily="34" charset="77"/>
+                <a:cs typeface="Arial" panose="020B0604020202020204" pitchFamily="34" charset="0"/>
                 <a:hlinkClick r:id="rId5">
                   <a:extLst>
                     <a:ext uri="{A12FA001-AC4F-418D-AE19-62706E023703}">
@@ -15835,20 +15633,29 @@
               </a:rPr>
               <a:t>https://www.fao.org/faostat/en/#data/ET</a:t>
             </a:r>
-            <a:endParaRPr lang="en-US" sz="1800" dirty="0">
+            <a:endParaRPr lang="en-US" sz="1400" kern="100" dirty="0">
               <a:solidFill>
                 <a:schemeClr val="bg1"/>
               </a:solidFill>
               <a:latin typeface="Abadi MT Condensed Light" panose="020B0306030101010103" pitchFamily="34" charset="77"/>
+              <a:cs typeface="Arial" panose="020B0604020202020204" pitchFamily="34" charset="0"/>
             </a:endParaRPr>
           </a:p>
           <a:p>
+            <a:pPr marL="800100" lvl="1" indent="-342900">
+              <a:spcBef>
+                <a:spcPts val="0"/>
+              </a:spcBef>
+              <a:buFont typeface="Symbol" pitchFamily="2" charset="2"/>
+              <a:buChar char=""/>
+            </a:pPr>
             <a:r>
-              <a:rPr lang="en-US" sz="1800" dirty="0">
+              <a:rPr lang="en-US" sz="1400" kern="100" dirty="0">
                 <a:solidFill>
                   <a:schemeClr val="bg1"/>
                 </a:solidFill>
                 <a:latin typeface="Abadi MT Condensed Light" panose="020B0306030101010103" pitchFamily="34" charset="77"/>
+                <a:cs typeface="Arial" panose="020B0604020202020204" pitchFamily="34" charset="0"/>
                 <a:hlinkClick r:id="rId6">
                   <a:extLst>
                     <a:ext uri="{A12FA001-AC4F-418D-AE19-62706E023703}">
@@ -15859,19 +15666,27 @@
               </a:rPr>
               <a:t>https://www.oecd.org/sti/ind/carbondioxideemissionsembodiedininternationaltrade.htm</a:t>
             </a:r>
-            <a:endParaRPr lang="en-US" sz="1800">
+            <a:endParaRPr lang="en-US" sz="1400" kern="100" dirty="0">
               <a:solidFill>
                 <a:schemeClr val="bg1"/>
               </a:solidFill>
               <a:latin typeface="Abadi MT Condensed Light" panose="020B0306030101010103" pitchFamily="34" charset="77"/>
+              <a:cs typeface="Arial" panose="020B0604020202020204" pitchFamily="34" charset="0"/>
             </a:endParaRPr>
           </a:p>
           <a:p>
-            <a:endParaRPr lang="en-US" sz="1800" dirty="0">
+            <a:pPr marL="0" indent="0">
+              <a:spcBef>
+                <a:spcPts val="0"/>
+              </a:spcBef>
+              <a:buNone/>
+            </a:pPr>
+            <a:endParaRPr lang="en-US" sz="1800" kern="100" dirty="0">
               <a:solidFill>
                 <a:schemeClr val="bg1"/>
               </a:solidFill>
               <a:latin typeface="Abadi MT Condensed Light" panose="020B0306030101010103" pitchFamily="34" charset="77"/>
+              <a:cs typeface="Arial" panose="020B0604020202020204" pitchFamily="34" charset="0"/>
             </a:endParaRPr>
           </a:p>
           <a:p>

</xml_diff>

<commit_message>
Small update to PPT file
</commit_message>
<xml_diff>
--- a/Project 3-Global Climate Change.pptx
+++ b/Project 3-Global Climate Change.pptx
@@ -167,7 +167,7 @@
           <a:noFill/>
           <a:extLst>
             <a:ext uri="{909E8E84-426E-40dd-AFC4-6F175D3DCCD1}">
-              <a14:hiddenFill xmlns="" xmlns:a14="http://schemas.microsoft.com/office/drawing/2010/main">
+              <a14:hiddenFill xmlns:a14="http://schemas.microsoft.com/office/drawing/2010/main" xmlns="">
                 <a:solidFill>
                   <a:srgbClr val="FFFFFF"/>
                 </a:solidFill>
@@ -227,7 +227,7 @@
             </a:ln>
             <a:extLst>
               <a:ext uri="{91240B29-F687-4f45-9708-019B960494DF}">
-                <a14:hiddenLine xmlns="" xmlns:a14="http://schemas.microsoft.com/office/drawing/2010/main" w="9525">
+                <a14:hiddenLine xmlns:a14="http://schemas.microsoft.com/office/drawing/2010/main" xmlns="" w="9525">
                   <a:solidFill>
                     <a:srgbClr val="000000"/>
                   </a:solidFill>
@@ -317,7 +317,7 @@
             </a:ln>
             <a:extLst>
               <a:ext uri="{91240B29-F687-4f45-9708-019B960494DF}">
-                <a14:hiddenLine xmlns="" xmlns:a14="http://schemas.microsoft.com/office/drawing/2010/main" w="9525">
+                <a14:hiddenLine xmlns:a14="http://schemas.microsoft.com/office/drawing/2010/main" xmlns="" w="9525">
                   <a:solidFill>
                     <a:srgbClr val="000000"/>
                   </a:solidFill>
@@ -407,7 +407,7 @@
             </a:ln>
             <a:extLst>
               <a:ext uri="{91240B29-F687-4f45-9708-019B960494DF}">
-                <a14:hiddenLine xmlns="" xmlns:a14="http://schemas.microsoft.com/office/drawing/2010/main" w="9525">
+                <a14:hiddenLine xmlns:a14="http://schemas.microsoft.com/office/drawing/2010/main" xmlns="" w="9525">
                   <a:solidFill>
                     <a:srgbClr val="000000"/>
                   </a:solidFill>
@@ -441,7 +441,7 @@
             </a:ln>
             <a:extLst>
               <a:ext uri="{91240B29-F687-4f45-9708-019B960494DF}">
-                <a14:hiddenLine xmlns="" xmlns:a14="http://schemas.microsoft.com/office/drawing/2010/main" w="9525">
+                <a14:hiddenLine xmlns:a14="http://schemas.microsoft.com/office/drawing/2010/main" xmlns="" w="9525">
                   <a:solidFill>
                     <a:srgbClr val="000000"/>
                   </a:solidFill>
@@ -531,7 +531,7 @@
             </a:ln>
             <a:extLst>
               <a:ext uri="{91240B29-F687-4f45-9708-019B960494DF}">
-                <a14:hiddenLine xmlns="" xmlns:a14="http://schemas.microsoft.com/office/drawing/2010/main" w="9525">
+                <a14:hiddenLine xmlns:a14="http://schemas.microsoft.com/office/drawing/2010/main" xmlns="" w="9525">
                   <a:solidFill>
                     <a:srgbClr val="000000"/>
                   </a:solidFill>
@@ -593,7 +593,7 @@
             </a:ln>
             <a:extLst>
               <a:ext uri="{91240B29-F687-4f45-9708-019B960494DF}">
-                <a14:hiddenLine xmlns="" xmlns:a14="http://schemas.microsoft.com/office/drawing/2010/main" w="9525">
+                <a14:hiddenLine xmlns:a14="http://schemas.microsoft.com/office/drawing/2010/main" xmlns="" w="9525">
                   <a:solidFill>
                     <a:srgbClr val="000000"/>
                   </a:solidFill>
@@ -655,7 +655,7 @@
             </a:ln>
             <a:extLst>
               <a:ext uri="{91240B29-F687-4f45-9708-019B960494DF}">
-                <a14:hiddenLine xmlns="" xmlns:a14="http://schemas.microsoft.com/office/drawing/2010/main" w="9525">
+                <a14:hiddenLine xmlns:a14="http://schemas.microsoft.com/office/drawing/2010/main" xmlns="" w="9525">
                   <a:solidFill>
                     <a:srgbClr val="000000"/>
                   </a:solidFill>
@@ -745,7 +745,7 @@
             </a:ln>
             <a:extLst>
               <a:ext uri="{91240B29-F687-4f45-9708-019B960494DF}">
-                <a14:hiddenLine xmlns="" xmlns:a14="http://schemas.microsoft.com/office/drawing/2010/main" w="9525">
+                <a14:hiddenLine xmlns:a14="http://schemas.microsoft.com/office/drawing/2010/main" xmlns="" w="9525">
                   <a:solidFill>
                     <a:srgbClr val="000000"/>
                   </a:solidFill>
@@ -807,7 +807,7 @@
             </a:ln>
             <a:extLst>
               <a:ext uri="{91240B29-F687-4f45-9708-019B960494DF}">
-                <a14:hiddenLine xmlns="" xmlns:a14="http://schemas.microsoft.com/office/drawing/2010/main" w="9525">
+                <a14:hiddenLine xmlns:a14="http://schemas.microsoft.com/office/drawing/2010/main" xmlns="" w="9525">
                   <a:solidFill>
                     <a:srgbClr val="000000"/>
                   </a:solidFill>
@@ -869,7 +869,7 @@
             </a:ln>
             <a:extLst>
               <a:ext uri="{91240B29-F687-4f45-9708-019B960494DF}">
-                <a14:hiddenLine xmlns="" xmlns:a14="http://schemas.microsoft.com/office/drawing/2010/main" w="9525">
+                <a14:hiddenLine xmlns:a14="http://schemas.microsoft.com/office/drawing/2010/main" xmlns="" w="9525">
                   <a:solidFill>
                     <a:srgbClr val="000000"/>
                   </a:solidFill>
@@ -959,7 +959,7 @@
             </a:ln>
             <a:extLst>
               <a:ext uri="{91240B29-F687-4f45-9708-019B960494DF}">
-                <a14:hiddenLine xmlns="" xmlns:a14="http://schemas.microsoft.com/office/drawing/2010/main" w="9525">
+                <a14:hiddenLine xmlns:a14="http://schemas.microsoft.com/office/drawing/2010/main" xmlns="" w="9525">
                   <a:solidFill>
                     <a:srgbClr val="000000"/>
                   </a:solidFill>
@@ -1049,7 +1049,7 @@
             </a:ln>
             <a:extLst>
               <a:ext uri="{91240B29-F687-4f45-9708-019B960494DF}">
-                <a14:hiddenLine xmlns="" xmlns:a14="http://schemas.microsoft.com/office/drawing/2010/main" w="9525">
+                <a14:hiddenLine xmlns:a14="http://schemas.microsoft.com/office/drawing/2010/main" xmlns="" w="9525">
                   <a:solidFill>
                     <a:srgbClr val="000000"/>
                   </a:solidFill>
@@ -1111,7 +1111,7 @@
             </a:ln>
             <a:extLst>
               <a:ext uri="{91240B29-F687-4f45-9708-019B960494DF}">
-                <a14:hiddenLine xmlns="" xmlns:a14="http://schemas.microsoft.com/office/drawing/2010/main" w="9525">
+                <a14:hiddenLine xmlns:a14="http://schemas.microsoft.com/office/drawing/2010/main" xmlns="" w="9525">
                   <a:solidFill>
                     <a:srgbClr val="000000"/>
                   </a:solidFill>
@@ -1221,7 +1221,7 @@
             </a:ln>
             <a:extLst>
               <a:ext uri="{91240B29-F687-4f45-9708-019B960494DF}">
-                <a14:hiddenLine xmlns="" xmlns:a14="http://schemas.microsoft.com/office/drawing/2010/main" w="9525">
+                <a14:hiddenLine xmlns:a14="http://schemas.microsoft.com/office/drawing/2010/main" xmlns="" w="9525">
                   <a:solidFill>
                     <a:srgbClr val="000000"/>
                   </a:solidFill>
@@ -1283,7 +1283,7 @@
             </a:ln>
             <a:extLst>
               <a:ext uri="{91240B29-F687-4f45-9708-019B960494DF}">
-                <a14:hiddenLine xmlns="" xmlns:a14="http://schemas.microsoft.com/office/drawing/2010/main" w="9525">
+                <a14:hiddenLine xmlns:a14="http://schemas.microsoft.com/office/drawing/2010/main" xmlns="" w="9525">
                   <a:solidFill>
                     <a:srgbClr val="000000"/>
                   </a:solidFill>
@@ -1373,7 +1373,7 @@
             </a:ln>
             <a:extLst>
               <a:ext uri="{91240B29-F687-4f45-9708-019B960494DF}">
-                <a14:hiddenLine xmlns="" xmlns:a14="http://schemas.microsoft.com/office/drawing/2010/main" w="9525">
+                <a14:hiddenLine xmlns:a14="http://schemas.microsoft.com/office/drawing/2010/main" xmlns="" w="9525">
                   <a:solidFill>
                     <a:srgbClr val="000000"/>
                   </a:solidFill>
@@ -1463,7 +1463,7 @@
             </a:ln>
             <a:extLst>
               <a:ext uri="{91240B29-F687-4f45-9708-019B960494DF}">
-                <a14:hiddenLine xmlns="" xmlns:a14="http://schemas.microsoft.com/office/drawing/2010/main" w="9525">
+                <a14:hiddenLine xmlns:a14="http://schemas.microsoft.com/office/drawing/2010/main" xmlns="" w="9525">
                   <a:solidFill>
                     <a:srgbClr val="000000"/>
                   </a:solidFill>
@@ -1525,7 +1525,7 @@
             </a:ln>
             <a:extLst>
               <a:ext uri="{91240B29-F687-4f45-9708-019B960494DF}">
-                <a14:hiddenLine xmlns="" xmlns:a14="http://schemas.microsoft.com/office/drawing/2010/main" w="9525">
+                <a14:hiddenLine xmlns:a14="http://schemas.microsoft.com/office/drawing/2010/main" xmlns="" w="9525">
                   <a:solidFill>
                     <a:srgbClr val="000000"/>
                   </a:solidFill>
@@ -1615,7 +1615,7 @@
             </a:ln>
             <a:extLst>
               <a:ext uri="{91240B29-F687-4f45-9708-019B960494DF}">
-                <a14:hiddenLine xmlns="" xmlns:a14="http://schemas.microsoft.com/office/drawing/2010/main" w="9525">
+                <a14:hiddenLine xmlns:a14="http://schemas.microsoft.com/office/drawing/2010/main" xmlns="" w="9525">
                   <a:solidFill>
                     <a:srgbClr val="000000"/>
                   </a:solidFill>
@@ -1705,7 +1705,7 @@
             </a:ln>
             <a:extLst>
               <a:ext uri="{91240B29-F687-4f45-9708-019B960494DF}">
-                <a14:hiddenLine xmlns="" xmlns:a14="http://schemas.microsoft.com/office/drawing/2010/main" w="9525">
+                <a14:hiddenLine xmlns:a14="http://schemas.microsoft.com/office/drawing/2010/main" xmlns="" w="9525">
                   <a:solidFill>
                     <a:srgbClr val="000000"/>
                   </a:solidFill>
@@ -1761,7 +1761,7 @@
             </a:ln>
             <a:extLst>
               <a:ext uri="{91240B29-F687-4f45-9708-019B960494DF}">
-                <a14:hiddenLine xmlns="" xmlns:a14="http://schemas.microsoft.com/office/drawing/2010/main" w="9525">
+                <a14:hiddenLine xmlns:a14="http://schemas.microsoft.com/office/drawing/2010/main" xmlns="" w="9525">
                   <a:solidFill>
                     <a:srgbClr val="000000"/>
                   </a:solidFill>
@@ -1851,7 +1851,7 @@
             </a:ln>
             <a:extLst>
               <a:ext uri="{91240B29-F687-4f45-9708-019B960494DF}">
-                <a14:hiddenLine xmlns="" xmlns:a14="http://schemas.microsoft.com/office/drawing/2010/main" w="9525">
+                <a14:hiddenLine xmlns:a14="http://schemas.microsoft.com/office/drawing/2010/main" xmlns="" w="9525">
                   <a:solidFill>
                     <a:srgbClr val="000000"/>
                   </a:solidFill>
@@ -1907,7 +1907,7 @@
             </a:ln>
             <a:extLst>
               <a:ext uri="{91240B29-F687-4f45-9708-019B960494DF}">
-                <a14:hiddenLine xmlns="" xmlns:a14="http://schemas.microsoft.com/office/drawing/2010/main" w="9525">
+                <a14:hiddenLine xmlns:a14="http://schemas.microsoft.com/office/drawing/2010/main" xmlns="" w="9525">
                   <a:solidFill>
                     <a:srgbClr val="000000"/>
                   </a:solidFill>
@@ -1997,7 +1997,7 @@
             </a:ln>
             <a:extLst>
               <a:ext uri="{91240B29-F687-4f45-9708-019B960494DF}">
-                <a14:hiddenLine xmlns="" xmlns:a14="http://schemas.microsoft.com/office/drawing/2010/main" w="9525">
+                <a14:hiddenLine xmlns:a14="http://schemas.microsoft.com/office/drawing/2010/main" xmlns="" w="9525">
                   <a:solidFill>
                     <a:srgbClr val="000000"/>
                   </a:solidFill>
@@ -2065,7 +2065,7 @@
             </a:ln>
             <a:extLst>
               <a:ext uri="{91240B29-F687-4f45-9708-019B960494DF}">
-                <a14:hiddenLine xmlns="" xmlns:a14="http://schemas.microsoft.com/office/drawing/2010/main" w="9525">
+                <a14:hiddenLine xmlns:a14="http://schemas.microsoft.com/office/drawing/2010/main" xmlns="" w="9525">
                   <a:solidFill>
                     <a:srgbClr val="000000"/>
                   </a:solidFill>
@@ -2155,7 +2155,7 @@
             </a:ln>
             <a:extLst>
               <a:ext uri="{91240B29-F687-4f45-9708-019B960494DF}">
-                <a14:hiddenLine xmlns="" xmlns:a14="http://schemas.microsoft.com/office/drawing/2010/main" w="9525">
+                <a14:hiddenLine xmlns:a14="http://schemas.microsoft.com/office/drawing/2010/main" xmlns="" w="9525">
                   <a:solidFill>
                     <a:srgbClr val="000000"/>
                   </a:solidFill>
@@ -2223,7 +2223,7 @@
             </a:ln>
             <a:extLst>
               <a:ext uri="{91240B29-F687-4f45-9708-019B960494DF}">
-                <a14:hiddenLine xmlns="" xmlns:a14="http://schemas.microsoft.com/office/drawing/2010/main" w="9525">
+                <a14:hiddenLine xmlns:a14="http://schemas.microsoft.com/office/drawing/2010/main" xmlns="" w="9525">
                   <a:solidFill>
                     <a:srgbClr val="000000"/>
                   </a:solidFill>
@@ -2313,7 +2313,7 @@
             </a:ln>
             <a:extLst>
               <a:ext uri="{91240B29-F687-4f45-9708-019B960494DF}">
-                <a14:hiddenLine xmlns="" xmlns:a14="http://schemas.microsoft.com/office/drawing/2010/main" w="9525">
+                <a14:hiddenLine xmlns:a14="http://schemas.microsoft.com/office/drawing/2010/main" xmlns="" w="9525">
                   <a:solidFill>
                     <a:srgbClr val="000000"/>
                   </a:solidFill>
@@ -2347,7 +2347,7 @@
             </a:ln>
             <a:extLst>
               <a:ext uri="{91240B29-F687-4f45-9708-019B960494DF}">
-                <a14:hiddenLine xmlns="" xmlns:a14="http://schemas.microsoft.com/office/drawing/2010/main" w="9525">
+                <a14:hiddenLine xmlns:a14="http://schemas.microsoft.com/office/drawing/2010/main" xmlns="" w="9525">
                   <a:solidFill>
                     <a:srgbClr val="000000"/>
                   </a:solidFill>
@@ -2437,7 +2437,7 @@
             </a:ln>
             <a:extLst>
               <a:ext uri="{91240B29-F687-4f45-9708-019B960494DF}">
-                <a14:hiddenLine xmlns="" xmlns:a14="http://schemas.microsoft.com/office/drawing/2010/main" w="9525">
+                <a14:hiddenLine xmlns:a14="http://schemas.microsoft.com/office/drawing/2010/main" xmlns="" w="9525">
                   <a:solidFill>
                     <a:srgbClr val="000000"/>
                   </a:solidFill>
@@ -2499,7 +2499,7 @@
             </a:ln>
             <a:extLst>
               <a:ext uri="{91240B29-F687-4f45-9708-019B960494DF}">
-                <a14:hiddenLine xmlns="" xmlns:a14="http://schemas.microsoft.com/office/drawing/2010/main" w="9525">
+                <a14:hiddenLine xmlns:a14="http://schemas.microsoft.com/office/drawing/2010/main" xmlns="" w="9525">
                   <a:solidFill>
                     <a:srgbClr val="000000"/>
                   </a:solidFill>
@@ -2561,7 +2561,7 @@
             </a:ln>
             <a:extLst>
               <a:ext uri="{91240B29-F687-4f45-9708-019B960494DF}">
-                <a14:hiddenLine xmlns="" xmlns:a14="http://schemas.microsoft.com/office/drawing/2010/main" w="9525">
+                <a14:hiddenLine xmlns:a14="http://schemas.microsoft.com/office/drawing/2010/main" xmlns="" w="9525">
                   <a:solidFill>
                     <a:srgbClr val="000000"/>
                   </a:solidFill>
@@ -2651,7 +2651,7 @@
             </a:ln>
             <a:extLst>
               <a:ext uri="{91240B29-F687-4f45-9708-019B960494DF}">
-                <a14:hiddenLine xmlns="" xmlns:a14="http://schemas.microsoft.com/office/drawing/2010/main" w="9525">
+                <a14:hiddenLine xmlns:a14="http://schemas.microsoft.com/office/drawing/2010/main" xmlns="" w="9525">
                   <a:solidFill>
                     <a:srgbClr val="000000"/>
                   </a:solidFill>
@@ -2719,7 +2719,7 @@
             </a:ln>
             <a:extLst>
               <a:ext uri="{91240B29-F687-4f45-9708-019B960494DF}">
-                <a14:hiddenLine xmlns="" xmlns:a14="http://schemas.microsoft.com/office/drawing/2010/main" w="9525">
+                <a14:hiddenLine xmlns:a14="http://schemas.microsoft.com/office/drawing/2010/main" xmlns="" w="9525">
                   <a:solidFill>
                     <a:srgbClr val="000000"/>
                   </a:solidFill>
@@ -2781,7 +2781,7 @@
             </a:ln>
             <a:extLst>
               <a:ext uri="{91240B29-F687-4f45-9708-019B960494DF}">
-                <a14:hiddenLine xmlns="" xmlns:a14="http://schemas.microsoft.com/office/drawing/2010/main" w="9525">
+                <a14:hiddenLine xmlns:a14="http://schemas.microsoft.com/office/drawing/2010/main" xmlns="" w="9525">
                   <a:solidFill>
                     <a:srgbClr val="000000"/>
                   </a:solidFill>
@@ -2871,7 +2871,7 @@
             </a:ln>
             <a:extLst>
               <a:ext uri="{91240B29-F687-4f45-9708-019B960494DF}">
-                <a14:hiddenLine xmlns="" xmlns:a14="http://schemas.microsoft.com/office/drawing/2010/main" w="9525">
+                <a14:hiddenLine xmlns:a14="http://schemas.microsoft.com/office/drawing/2010/main" xmlns="" w="9525">
                   <a:solidFill>
                     <a:srgbClr val="000000"/>
                   </a:solidFill>
@@ -2933,7 +2933,7 @@
             </a:ln>
             <a:extLst>
               <a:ext uri="{91240B29-F687-4f45-9708-019B960494DF}">
-                <a14:hiddenLine xmlns="" xmlns:a14="http://schemas.microsoft.com/office/drawing/2010/main" w="9525">
+                <a14:hiddenLine xmlns:a14="http://schemas.microsoft.com/office/drawing/2010/main" xmlns="" w="9525">
                   <a:solidFill>
                     <a:srgbClr val="000000"/>
                   </a:solidFill>
@@ -3023,7 +3023,7 @@
             </a:ln>
             <a:extLst>
               <a:ext uri="{91240B29-F687-4f45-9708-019B960494DF}">
-                <a14:hiddenLine xmlns="" xmlns:a14="http://schemas.microsoft.com/office/drawing/2010/main" w="9525">
+                <a14:hiddenLine xmlns:a14="http://schemas.microsoft.com/office/drawing/2010/main" xmlns="" w="9525">
                   <a:solidFill>
                     <a:srgbClr val="000000"/>
                   </a:solidFill>
@@ -3085,7 +3085,7 @@
             </a:ln>
             <a:extLst>
               <a:ext uri="{91240B29-F687-4f45-9708-019B960494DF}">
-                <a14:hiddenLine xmlns="" xmlns:a14="http://schemas.microsoft.com/office/drawing/2010/main" w="9525">
+                <a14:hiddenLine xmlns:a14="http://schemas.microsoft.com/office/drawing/2010/main" xmlns="" w="9525">
                   <a:solidFill>
                     <a:srgbClr val="000000"/>
                   </a:solidFill>
@@ -3175,7 +3175,7 @@
             </a:ln>
             <a:extLst>
               <a:ext uri="{91240B29-F687-4f45-9708-019B960494DF}">
-                <a14:hiddenLine xmlns="" xmlns:a14="http://schemas.microsoft.com/office/drawing/2010/main" w="9525">
+                <a14:hiddenLine xmlns:a14="http://schemas.microsoft.com/office/drawing/2010/main" xmlns="" w="9525">
                   <a:solidFill>
                     <a:srgbClr val="000000"/>
                   </a:solidFill>
@@ -3209,7 +3209,7 @@
             </a:ln>
             <a:extLst>
               <a:ext uri="{91240B29-F687-4f45-9708-019B960494DF}">
-                <a14:hiddenLine xmlns="" xmlns:a14="http://schemas.microsoft.com/office/drawing/2010/main" w="9525">
+                <a14:hiddenLine xmlns:a14="http://schemas.microsoft.com/office/drawing/2010/main" xmlns="" w="9525">
                   <a:solidFill>
                     <a:srgbClr val="000000"/>
                   </a:solidFill>
@@ -3274,7 +3274,7 @@
             </a:ln>
             <a:extLst>
               <a:ext uri="{91240B29-F687-4f45-9708-019B960494DF}">
-                <a14:hiddenLine xmlns="" xmlns:a14="http://schemas.microsoft.com/office/drawing/2010/main" w="9525">
+                <a14:hiddenLine xmlns:a14="http://schemas.microsoft.com/office/drawing/2010/main" xmlns="" w="9525">
                   <a:solidFill>
                     <a:srgbClr val="000000"/>
                   </a:solidFill>
@@ -3364,7 +3364,7 @@
             </a:ln>
             <a:extLst>
               <a:ext uri="{91240B29-F687-4f45-9708-019B960494DF}">
-                <a14:hiddenLine xmlns="" xmlns:a14="http://schemas.microsoft.com/office/drawing/2010/main" w="9525">
+                <a14:hiddenLine xmlns:a14="http://schemas.microsoft.com/office/drawing/2010/main" xmlns="" w="9525">
                   <a:solidFill>
                     <a:srgbClr val="000000"/>
                   </a:solidFill>
@@ -3426,7 +3426,7 @@
             </a:ln>
             <a:extLst>
               <a:ext uri="{91240B29-F687-4f45-9708-019B960494DF}">
-                <a14:hiddenLine xmlns="" xmlns:a14="http://schemas.microsoft.com/office/drawing/2010/main" w="9525">
+                <a14:hiddenLine xmlns:a14="http://schemas.microsoft.com/office/drawing/2010/main" xmlns="" w="9525">
                   <a:solidFill>
                     <a:srgbClr val="000000"/>
                   </a:solidFill>
@@ -3516,7 +3516,7 @@
             </a:ln>
             <a:extLst>
               <a:ext uri="{91240B29-F687-4f45-9708-019B960494DF}">
-                <a14:hiddenLine xmlns="" xmlns:a14="http://schemas.microsoft.com/office/drawing/2010/main" w="9525">
+                <a14:hiddenLine xmlns:a14="http://schemas.microsoft.com/office/drawing/2010/main" xmlns="" w="9525">
                   <a:solidFill>
                     <a:srgbClr val="000000"/>
                   </a:solidFill>
@@ -3606,7 +3606,7 @@
             </a:ln>
             <a:extLst>
               <a:ext uri="{91240B29-F687-4f45-9708-019B960494DF}">
-                <a14:hiddenLine xmlns="" xmlns:a14="http://schemas.microsoft.com/office/drawing/2010/main" w="9525">
+                <a14:hiddenLine xmlns:a14="http://schemas.microsoft.com/office/drawing/2010/main" xmlns="" w="9525">
                   <a:solidFill>
                     <a:srgbClr val="000000"/>
                   </a:solidFill>
@@ -3671,7 +3671,7 @@
             </a:ln>
             <a:extLst>
               <a:ext uri="{91240B29-F687-4f45-9708-019B960494DF}">
-                <a14:hiddenLine xmlns="" xmlns:a14="http://schemas.microsoft.com/office/drawing/2010/main" w="9525">
+                <a14:hiddenLine xmlns:a14="http://schemas.microsoft.com/office/drawing/2010/main" xmlns="" w="9525">
                   <a:solidFill>
                     <a:srgbClr val="000000"/>
                   </a:solidFill>
@@ -3733,7 +3733,7 @@
             </a:ln>
             <a:extLst>
               <a:ext uri="{91240B29-F687-4f45-9708-019B960494DF}">
-                <a14:hiddenLine xmlns="" xmlns:a14="http://schemas.microsoft.com/office/drawing/2010/main" w="9525">
+                <a14:hiddenLine xmlns:a14="http://schemas.microsoft.com/office/drawing/2010/main" xmlns="" w="9525">
                   <a:solidFill>
                     <a:srgbClr val="000000"/>
                   </a:solidFill>
@@ -3823,7 +3823,7 @@
             </a:ln>
             <a:extLst>
               <a:ext uri="{91240B29-F687-4f45-9708-019B960494DF}">
-                <a14:hiddenLine xmlns="" xmlns:a14="http://schemas.microsoft.com/office/drawing/2010/main" w="9525">
+                <a14:hiddenLine xmlns:a14="http://schemas.microsoft.com/office/drawing/2010/main" xmlns="" w="9525">
                   <a:solidFill>
                     <a:srgbClr val="000000"/>
                   </a:solidFill>
@@ -3913,7 +3913,7 @@
             </a:ln>
             <a:extLst>
               <a:ext uri="{91240B29-F687-4f45-9708-019B960494DF}">
-                <a14:hiddenLine xmlns="" xmlns:a14="http://schemas.microsoft.com/office/drawing/2010/main" w="9525">
+                <a14:hiddenLine xmlns:a14="http://schemas.microsoft.com/office/drawing/2010/main" xmlns="" w="9525">
                   <a:solidFill>
                     <a:srgbClr val="000000"/>
                   </a:solidFill>
@@ -3975,7 +3975,7 @@
             </a:ln>
             <a:extLst>
               <a:ext uri="{91240B29-F687-4f45-9708-019B960494DF}">
-                <a14:hiddenLine xmlns="" xmlns:a14="http://schemas.microsoft.com/office/drawing/2010/main" w="9525">
+                <a14:hiddenLine xmlns:a14="http://schemas.microsoft.com/office/drawing/2010/main" xmlns="" w="9525">
                   <a:solidFill>
                     <a:srgbClr val="000000"/>
                   </a:solidFill>
@@ -4095,7 +4095,7 @@
             </a:ln>
             <a:extLst>
               <a:ext uri="{91240B29-F687-4f45-9708-019B960494DF}">
-                <a14:hiddenLine xmlns="" xmlns:a14="http://schemas.microsoft.com/office/drawing/2010/main" w="9525">
+                <a14:hiddenLine xmlns:a14="http://schemas.microsoft.com/office/drawing/2010/main" xmlns="" w="9525">
                   <a:solidFill>
                     <a:srgbClr val="000000"/>
                   </a:solidFill>
@@ -4163,7 +4163,7 @@
             </a:ln>
             <a:extLst>
               <a:ext uri="{91240B29-F687-4f45-9708-019B960494DF}">
-                <a14:hiddenLine xmlns="" xmlns:a14="http://schemas.microsoft.com/office/drawing/2010/main" w="9525">
+                <a14:hiddenLine xmlns:a14="http://schemas.microsoft.com/office/drawing/2010/main" xmlns="" w="9525">
                   <a:solidFill>
                     <a:srgbClr val="000000"/>
                   </a:solidFill>
@@ -4253,7 +4253,7 @@
             </a:ln>
             <a:extLst>
               <a:ext uri="{91240B29-F687-4f45-9708-019B960494DF}">
-                <a14:hiddenLine xmlns="" xmlns:a14="http://schemas.microsoft.com/office/drawing/2010/main" w="9525">
+                <a14:hiddenLine xmlns:a14="http://schemas.microsoft.com/office/drawing/2010/main" xmlns="" w="9525">
                   <a:solidFill>
                     <a:srgbClr val="000000"/>
                   </a:solidFill>
@@ -8975,7 +8975,7 @@
           <a:noFill/>
           <a:extLst>
             <a:ext uri="{909E8E84-426E-40dd-AFC4-6F175D3DCCD1}">
-              <a14:hiddenFill xmlns="" xmlns:a14="http://schemas.microsoft.com/office/drawing/2010/main">
+              <a14:hiddenFill xmlns:a14="http://schemas.microsoft.com/office/drawing/2010/main" xmlns="">
                 <a:solidFill>
                   <a:srgbClr val="FFFFFF"/>
                 </a:solidFill>
@@ -9049,7 +9049,7 @@
               </a:ln>
               <a:extLst>
                 <a:ext uri="{91240B29-F687-4f45-9708-019B960494DF}">
-                  <a14:hiddenLine xmlns="" xmlns:a14="http://schemas.microsoft.com/office/drawing/2010/main" w="9525">
+                  <a14:hiddenLine xmlns:a14="http://schemas.microsoft.com/office/drawing/2010/main" xmlns="" w="9525">
                     <a:solidFill>
                       <a:srgbClr val="000000"/>
                     </a:solidFill>
@@ -9139,7 +9139,7 @@
               </a:ln>
               <a:extLst>
                 <a:ext uri="{91240B29-F687-4f45-9708-019B960494DF}">
-                  <a14:hiddenLine xmlns="" xmlns:a14="http://schemas.microsoft.com/office/drawing/2010/main" w="9525">
+                  <a14:hiddenLine xmlns:a14="http://schemas.microsoft.com/office/drawing/2010/main" xmlns="" w="9525">
                     <a:solidFill>
                       <a:srgbClr val="000000"/>
                     </a:solidFill>
@@ -9229,7 +9229,7 @@
               </a:ln>
               <a:extLst>
                 <a:ext uri="{91240B29-F687-4f45-9708-019B960494DF}">
-                  <a14:hiddenLine xmlns="" xmlns:a14="http://schemas.microsoft.com/office/drawing/2010/main" w="9525">
+                  <a14:hiddenLine xmlns:a14="http://schemas.microsoft.com/office/drawing/2010/main" xmlns="" w="9525">
                     <a:solidFill>
                       <a:srgbClr val="000000"/>
                     </a:solidFill>
@@ -9291,7 +9291,7 @@
               </a:ln>
               <a:extLst>
                 <a:ext uri="{91240B29-F687-4f45-9708-019B960494DF}">
-                  <a14:hiddenLine xmlns="" xmlns:a14="http://schemas.microsoft.com/office/drawing/2010/main" w="9525">
+                  <a14:hiddenLine xmlns:a14="http://schemas.microsoft.com/office/drawing/2010/main" xmlns="" w="9525">
                     <a:solidFill>
                       <a:srgbClr val="000000"/>
                     </a:solidFill>
@@ -9381,7 +9381,7 @@
               </a:ln>
               <a:extLst>
                 <a:ext uri="{91240B29-F687-4f45-9708-019B960494DF}">
-                  <a14:hiddenLine xmlns="" xmlns:a14="http://schemas.microsoft.com/office/drawing/2010/main" w="9525">
+                  <a14:hiddenLine xmlns:a14="http://schemas.microsoft.com/office/drawing/2010/main" xmlns="" w="9525">
                     <a:solidFill>
                       <a:srgbClr val="000000"/>
                     </a:solidFill>
@@ -9443,7 +9443,7 @@
               </a:ln>
               <a:extLst>
                 <a:ext uri="{91240B29-F687-4f45-9708-019B960494DF}">
-                  <a14:hiddenLine xmlns="" xmlns:a14="http://schemas.microsoft.com/office/drawing/2010/main" w="9525">
+                  <a14:hiddenLine xmlns:a14="http://schemas.microsoft.com/office/drawing/2010/main" xmlns="" w="9525">
                     <a:solidFill>
                       <a:srgbClr val="000000"/>
                     </a:solidFill>
@@ -9505,7 +9505,7 @@
               </a:ln>
               <a:extLst>
                 <a:ext uri="{91240B29-F687-4f45-9708-019B960494DF}">
-                  <a14:hiddenLine xmlns="" xmlns:a14="http://schemas.microsoft.com/office/drawing/2010/main" w="9525">
+                  <a14:hiddenLine xmlns:a14="http://schemas.microsoft.com/office/drawing/2010/main" xmlns="" w="9525">
                     <a:solidFill>
                       <a:srgbClr val="000000"/>
                     </a:solidFill>
@@ -9595,7 +9595,7 @@
               </a:ln>
               <a:extLst>
                 <a:ext uri="{91240B29-F687-4f45-9708-019B960494DF}">
-                  <a14:hiddenLine xmlns="" xmlns:a14="http://schemas.microsoft.com/office/drawing/2010/main" w="9525">
+                  <a14:hiddenLine xmlns:a14="http://schemas.microsoft.com/office/drawing/2010/main" xmlns="" w="9525">
                     <a:solidFill>
                       <a:srgbClr val="000000"/>
                     </a:solidFill>
@@ -9685,7 +9685,7 @@
               </a:ln>
               <a:extLst>
                 <a:ext uri="{91240B29-F687-4f45-9708-019B960494DF}">
-                  <a14:hiddenLine xmlns="" xmlns:a14="http://schemas.microsoft.com/office/drawing/2010/main" w="9525">
+                  <a14:hiddenLine xmlns:a14="http://schemas.microsoft.com/office/drawing/2010/main" xmlns="" w="9525">
                     <a:solidFill>
                       <a:srgbClr val="000000"/>
                     </a:solidFill>
@@ -9747,7 +9747,7 @@
               </a:ln>
               <a:extLst>
                 <a:ext uri="{91240B29-F687-4f45-9708-019B960494DF}">
-                  <a14:hiddenLine xmlns="" xmlns:a14="http://schemas.microsoft.com/office/drawing/2010/main" w="9525">
+                  <a14:hiddenLine xmlns:a14="http://schemas.microsoft.com/office/drawing/2010/main" xmlns="" w="9525">
                     <a:solidFill>
                       <a:srgbClr val="000000"/>
                     </a:solidFill>
@@ -9857,7 +9857,7 @@
               </a:ln>
               <a:extLst>
                 <a:ext uri="{91240B29-F687-4f45-9708-019B960494DF}">
-                  <a14:hiddenLine xmlns="" xmlns:a14="http://schemas.microsoft.com/office/drawing/2010/main" w="9525">
+                  <a14:hiddenLine xmlns:a14="http://schemas.microsoft.com/office/drawing/2010/main" xmlns="" w="9525">
                     <a:solidFill>
                       <a:srgbClr val="000000"/>
                     </a:solidFill>
@@ -9941,7 +9941,7 @@
               </a:ln>
               <a:extLst>
                 <a:ext uri="{91240B29-F687-4f45-9708-019B960494DF}">
-                  <a14:hiddenLine xmlns="" xmlns:a14="http://schemas.microsoft.com/office/drawing/2010/main" w="9525">
+                  <a14:hiddenLine xmlns:a14="http://schemas.microsoft.com/office/drawing/2010/main" xmlns="" w="9525">
                     <a:solidFill>
                       <a:srgbClr val="000000"/>
                     </a:solidFill>
@@ -10003,7 +10003,7 @@
               </a:ln>
               <a:extLst>
                 <a:ext uri="{91240B29-F687-4f45-9708-019B960494DF}">
-                  <a14:hiddenLine xmlns="" xmlns:a14="http://schemas.microsoft.com/office/drawing/2010/main" w="9525">
+                  <a14:hiddenLine xmlns:a14="http://schemas.microsoft.com/office/drawing/2010/main" xmlns="" w="9525">
                     <a:solidFill>
                       <a:srgbClr val="000000"/>
                     </a:solidFill>
@@ -10065,7 +10065,7 @@
               </a:ln>
               <a:extLst>
                 <a:ext uri="{91240B29-F687-4f45-9708-019B960494DF}">
-                  <a14:hiddenLine xmlns="" xmlns:a14="http://schemas.microsoft.com/office/drawing/2010/main" w="9525">
+                  <a14:hiddenLine xmlns:a14="http://schemas.microsoft.com/office/drawing/2010/main" xmlns="" w="9525">
                     <a:solidFill>
                       <a:srgbClr val="000000"/>
                     </a:solidFill>
@@ -10155,7 +10155,7 @@
               </a:ln>
               <a:extLst>
                 <a:ext uri="{91240B29-F687-4f45-9708-019B960494DF}">
-                  <a14:hiddenLine xmlns="" xmlns:a14="http://schemas.microsoft.com/office/drawing/2010/main" w="9525">
+                  <a14:hiddenLine xmlns:a14="http://schemas.microsoft.com/office/drawing/2010/main" xmlns="" w="9525">
                     <a:solidFill>
                       <a:srgbClr val="000000"/>
                     </a:solidFill>
@@ -10189,7 +10189,7 @@
               </a:ln>
               <a:extLst>
                 <a:ext uri="{91240B29-F687-4f45-9708-019B960494DF}">
-                  <a14:hiddenLine xmlns="" xmlns:a14="http://schemas.microsoft.com/office/drawing/2010/main" w="9525">
+                  <a14:hiddenLine xmlns:a14="http://schemas.microsoft.com/office/drawing/2010/main" xmlns="" w="9525">
                     <a:solidFill>
                       <a:srgbClr val="000000"/>
                     </a:solidFill>
@@ -10254,7 +10254,7 @@
               </a:ln>
               <a:extLst>
                 <a:ext uri="{91240B29-F687-4f45-9708-019B960494DF}">
-                  <a14:hiddenLine xmlns="" xmlns:a14="http://schemas.microsoft.com/office/drawing/2010/main" w="9525">
+                  <a14:hiddenLine xmlns:a14="http://schemas.microsoft.com/office/drawing/2010/main" xmlns="" w="9525">
                     <a:solidFill>
                       <a:srgbClr val="000000"/>
                     </a:solidFill>
@@ -10344,7 +10344,7 @@
               </a:ln>
               <a:extLst>
                 <a:ext uri="{91240B29-F687-4f45-9708-019B960494DF}">
-                  <a14:hiddenLine xmlns="" xmlns:a14="http://schemas.microsoft.com/office/drawing/2010/main" w="9525">
+                  <a14:hiddenLine xmlns:a14="http://schemas.microsoft.com/office/drawing/2010/main" xmlns="" w="9525">
                     <a:solidFill>
                       <a:srgbClr val="000000"/>
                     </a:solidFill>
@@ -10406,7 +10406,7 @@
               </a:ln>
               <a:extLst>
                 <a:ext uri="{91240B29-F687-4f45-9708-019B960494DF}">
-                  <a14:hiddenLine xmlns="" xmlns:a14="http://schemas.microsoft.com/office/drawing/2010/main" w="9525">
+                  <a14:hiddenLine xmlns:a14="http://schemas.microsoft.com/office/drawing/2010/main" xmlns="" w="9525">
                     <a:solidFill>
                       <a:srgbClr val="000000"/>
                     </a:solidFill>
@@ -10496,7 +10496,7 @@
               </a:ln>
               <a:extLst>
                 <a:ext uri="{91240B29-F687-4f45-9708-019B960494DF}">
-                  <a14:hiddenLine xmlns="" xmlns:a14="http://schemas.microsoft.com/office/drawing/2010/main" w="9525">
+                  <a14:hiddenLine xmlns:a14="http://schemas.microsoft.com/office/drawing/2010/main" xmlns="" w="9525">
                     <a:solidFill>
                       <a:srgbClr val="000000"/>
                     </a:solidFill>
@@ -10561,7 +10561,7 @@
               </a:ln>
               <a:extLst>
                 <a:ext uri="{91240B29-F687-4f45-9708-019B960494DF}">
-                  <a14:hiddenLine xmlns="" xmlns:a14="http://schemas.microsoft.com/office/drawing/2010/main" w="9525">
+                  <a14:hiddenLine xmlns:a14="http://schemas.microsoft.com/office/drawing/2010/main" xmlns="" w="9525">
                     <a:solidFill>
                       <a:srgbClr val="000000"/>
                     </a:solidFill>
@@ -10623,7 +10623,7 @@
               </a:ln>
               <a:extLst>
                 <a:ext uri="{91240B29-F687-4f45-9708-019B960494DF}">
-                  <a14:hiddenLine xmlns="" xmlns:a14="http://schemas.microsoft.com/office/drawing/2010/main" w="9525">
+                  <a14:hiddenLine xmlns:a14="http://schemas.microsoft.com/office/drawing/2010/main" xmlns="" w="9525">
                     <a:solidFill>
                       <a:srgbClr val="000000"/>
                     </a:solidFill>
@@ -10713,7 +10713,7 @@
               </a:ln>
               <a:extLst>
                 <a:ext uri="{91240B29-F687-4f45-9708-019B960494DF}">
-                  <a14:hiddenLine xmlns="" xmlns:a14="http://schemas.microsoft.com/office/drawing/2010/main" w="9525">
+                  <a14:hiddenLine xmlns:a14="http://schemas.microsoft.com/office/drawing/2010/main" xmlns="" w="9525">
                     <a:solidFill>
                       <a:srgbClr val="000000"/>
                     </a:solidFill>
@@ -10803,7 +10803,7 @@
               </a:ln>
               <a:extLst>
                 <a:ext uri="{91240B29-F687-4f45-9708-019B960494DF}">
-                  <a14:hiddenLine xmlns="" xmlns:a14="http://schemas.microsoft.com/office/drawing/2010/main" w="9525">
+                  <a14:hiddenLine xmlns:a14="http://schemas.microsoft.com/office/drawing/2010/main" xmlns="" w="9525">
                     <a:solidFill>
                       <a:srgbClr val="000000"/>
                     </a:solidFill>
@@ -10868,7 +10868,7 @@
               </a:ln>
               <a:extLst>
                 <a:ext uri="{91240B29-F687-4f45-9708-019B960494DF}">
-                  <a14:hiddenLine xmlns="" xmlns:a14="http://schemas.microsoft.com/office/drawing/2010/main" w="9525">
+                  <a14:hiddenLine xmlns:a14="http://schemas.microsoft.com/office/drawing/2010/main" xmlns="" w="9525">
                     <a:solidFill>
                       <a:srgbClr val="000000"/>
                     </a:solidFill>
@@ -10988,7 +10988,7 @@
               </a:ln>
               <a:extLst>
                 <a:ext uri="{91240B29-F687-4f45-9708-019B960494DF}">
-                  <a14:hiddenLine xmlns="" xmlns:a14="http://schemas.microsoft.com/office/drawing/2010/main" w="9525">
+                  <a14:hiddenLine xmlns:a14="http://schemas.microsoft.com/office/drawing/2010/main" xmlns="" w="9525">
                     <a:solidFill>
                       <a:srgbClr val="000000"/>
                     </a:solidFill>
@@ -11086,7 +11086,7 @@
               </a:ln>
               <a:extLst>
                 <a:ext uri="{91240B29-F687-4f45-9708-019B960494DF}">
-                  <a14:hiddenLine xmlns="" xmlns:a14="http://schemas.microsoft.com/office/drawing/2010/main" w="9525">
+                  <a14:hiddenLine xmlns:a14="http://schemas.microsoft.com/office/drawing/2010/main" xmlns="" w="9525">
                     <a:solidFill>
                       <a:srgbClr val="000000"/>
                     </a:solidFill>
@@ -11201,7 +11201,7 @@
               </a:ln>
               <a:extLst>
                 <a:ext uri="{91240B29-F687-4f45-9708-019B960494DF}">
-                  <a14:hiddenLine xmlns="" xmlns:a14="http://schemas.microsoft.com/office/drawing/2010/main" w="9525">
+                  <a14:hiddenLine xmlns:a14="http://schemas.microsoft.com/office/drawing/2010/main" xmlns="" w="9525">
                     <a:solidFill>
                       <a:srgbClr val="000000"/>
                     </a:solidFill>
@@ -11291,7 +11291,7 @@
               </a:ln>
               <a:extLst>
                 <a:ext uri="{91240B29-F687-4f45-9708-019B960494DF}">
-                  <a14:hiddenLine xmlns="" xmlns:a14="http://schemas.microsoft.com/office/drawing/2010/main" w="9525">
+                  <a14:hiddenLine xmlns:a14="http://schemas.microsoft.com/office/drawing/2010/main" xmlns="" w="9525">
                     <a:solidFill>
                       <a:srgbClr val="000000"/>
                     </a:solidFill>
@@ -11356,7 +11356,7 @@
               </a:ln>
               <a:extLst>
                 <a:ext uri="{91240B29-F687-4f45-9708-019B960494DF}">
-                  <a14:hiddenLine xmlns="" xmlns:a14="http://schemas.microsoft.com/office/drawing/2010/main" w="9525">
+                  <a14:hiddenLine xmlns:a14="http://schemas.microsoft.com/office/drawing/2010/main" xmlns="" w="9525">
                     <a:solidFill>
                       <a:srgbClr val="000000"/>
                     </a:solidFill>
@@ -11446,7 +11446,7 @@
               </a:ln>
               <a:extLst>
                 <a:ext uri="{91240B29-F687-4f45-9708-019B960494DF}">
-                  <a14:hiddenLine xmlns="" xmlns:a14="http://schemas.microsoft.com/office/drawing/2010/main" w="9525">
+                  <a14:hiddenLine xmlns:a14="http://schemas.microsoft.com/office/drawing/2010/main" xmlns="" w="9525">
                     <a:solidFill>
                       <a:srgbClr val="000000"/>
                     </a:solidFill>
@@ -11514,7 +11514,7 @@
               </a:ln>
               <a:extLst>
                 <a:ext uri="{91240B29-F687-4f45-9708-019B960494DF}">
-                  <a14:hiddenLine xmlns="" xmlns:a14="http://schemas.microsoft.com/office/drawing/2010/main" w="9525">
+                  <a14:hiddenLine xmlns:a14="http://schemas.microsoft.com/office/drawing/2010/main" xmlns="" w="9525">
                     <a:solidFill>
                       <a:srgbClr val="000000"/>
                     </a:solidFill>
@@ -11604,7 +11604,7 @@
               </a:ln>
               <a:extLst>
                 <a:ext uri="{91240B29-F687-4f45-9708-019B960494DF}">
-                  <a14:hiddenLine xmlns="" xmlns:a14="http://schemas.microsoft.com/office/drawing/2010/main" w="9525">
+                  <a14:hiddenLine xmlns:a14="http://schemas.microsoft.com/office/drawing/2010/main" xmlns="" w="9525">
                     <a:solidFill>
                       <a:srgbClr val="000000"/>
                     </a:solidFill>
@@ -11672,7 +11672,7 @@
               </a:ln>
               <a:extLst>
                 <a:ext uri="{91240B29-F687-4f45-9708-019B960494DF}">
-                  <a14:hiddenLine xmlns="" xmlns:a14="http://schemas.microsoft.com/office/drawing/2010/main" w="9525">
+                  <a14:hiddenLine xmlns:a14="http://schemas.microsoft.com/office/drawing/2010/main" xmlns="" w="9525">
                     <a:solidFill>
                       <a:srgbClr val="000000"/>
                     </a:solidFill>
@@ -11762,7 +11762,7 @@
               </a:ln>
               <a:extLst>
                 <a:ext uri="{91240B29-F687-4f45-9708-019B960494DF}">
-                  <a14:hiddenLine xmlns="" xmlns:a14="http://schemas.microsoft.com/office/drawing/2010/main" w="9525">
+                  <a14:hiddenLine xmlns:a14="http://schemas.microsoft.com/office/drawing/2010/main" xmlns="" w="9525">
                     <a:solidFill>
                       <a:srgbClr val="000000"/>
                     </a:solidFill>
@@ -11796,7 +11796,7 @@
               </a:ln>
               <a:extLst>
                 <a:ext uri="{91240B29-F687-4f45-9708-019B960494DF}">
-                  <a14:hiddenLine xmlns="" xmlns:a14="http://schemas.microsoft.com/office/drawing/2010/main" w="9525">
+                  <a14:hiddenLine xmlns:a14="http://schemas.microsoft.com/office/drawing/2010/main" xmlns="" w="9525">
                     <a:solidFill>
                       <a:srgbClr val="000000"/>
                     </a:solidFill>
@@ -12521,7 +12521,7 @@
             <a:noFill/>
             <a:extLst>
               <a:ext uri="{909E8E84-426E-40dd-AFC4-6F175D3DCCD1}">
-                <a14:hiddenFill xmlns:p14="http://schemas.microsoft.com/office/powerpoint/2010/main" xmlns:a14="http://schemas.microsoft.com/office/drawing/2010/main" xmlns:a16="http://schemas.microsoft.com/office/drawing/2014/main" xmlns="">
+                <a14:hiddenFill xmlns="" xmlns:a16="http://schemas.microsoft.com/office/drawing/2014/main" xmlns:a14="http://schemas.microsoft.com/office/drawing/2010/main" xmlns:p14="http://schemas.microsoft.com/office/powerpoint/2010/main">
                   <a:solidFill>
                     <a:srgbClr val="FFFFFF"/>
                   </a:solidFill>
@@ -15549,124 +15549,6 @@
               <a:t>total-burden-of-disease-from-household-and-ambient-air-pollution</a:t>
             </a:r>
             <a:endParaRPr lang="en-US" sz="1800" kern="100" dirty="0">
-              <a:solidFill>
-                <a:schemeClr val="bg1"/>
-              </a:solidFill>
-              <a:latin typeface="Abadi MT Condensed Light" panose="020B0306030101010103" pitchFamily="34" charset="77"/>
-              <a:cs typeface="Arial" panose="020B0604020202020204" pitchFamily="34" charset="0"/>
-            </a:endParaRPr>
-          </a:p>
-          <a:p>
-            <a:pPr marL="800100" lvl="1" indent="-342900">
-              <a:spcBef>
-                <a:spcPts val="0"/>
-              </a:spcBef>
-              <a:buFont typeface="Symbol" pitchFamily="2" charset="2"/>
-              <a:buChar char=""/>
-            </a:pPr>
-            <a:r>
-              <a:rPr lang="en-US" sz="1400" u="sng" kern="100" dirty="0">
-                <a:solidFill>
-                  <a:schemeClr val="bg1"/>
-                </a:solidFill>
-                <a:latin typeface="Abadi MT Condensed Light" panose="020B0306030101010103" pitchFamily="34" charset="77"/>
-                <a:cs typeface="Arial" panose="020B0604020202020204" pitchFamily="34" charset="0"/>
-              </a:rPr>
-              <a:t>https://www.star.nesdis.noaa.gov/socd/lsa/SeaLevelRise/LSA_SLR_timeseries.php</a:t>
-            </a:r>
-          </a:p>
-          <a:p>
-            <a:pPr marL="800100" lvl="1" indent="-342900">
-              <a:spcBef>
-                <a:spcPts val="0"/>
-              </a:spcBef>
-              <a:buFont typeface="Symbol" pitchFamily="2" charset="2"/>
-              <a:buChar char=""/>
-            </a:pPr>
-            <a:r>
-              <a:rPr lang="en-US" sz="1400" kern="100" dirty="0">
-                <a:solidFill>
-                  <a:schemeClr val="bg1"/>
-                </a:solidFill>
-                <a:latin typeface="Abadi MT Condensed Light" panose="020B0306030101010103" pitchFamily="34" charset="77"/>
-                <a:cs typeface="Arial" panose="020B0604020202020204" pitchFamily="34" charset="0"/>
-                <a:hlinkClick r:id="rId4">
-                  <a:extLst>
-                    <a:ext uri="{A12FA001-AC4F-418D-AE19-62706E023703}">
-                      <ahyp:hlinkClr xmlns:ahyp="http://schemas.microsoft.com/office/drawing/2018/hyperlinkcolor" val="tx"/>
-                    </a:ext>
-                  </a:extLst>
-                </a:hlinkClick>
-              </a:rPr>
-              <a:t>https://opencagedata.com/</a:t>
-            </a:r>
-            <a:endParaRPr lang="en-US" sz="1400" kern="100" dirty="0">
-              <a:solidFill>
-                <a:schemeClr val="bg1"/>
-              </a:solidFill>
-              <a:latin typeface="Abadi MT Condensed Light" panose="020B0306030101010103" pitchFamily="34" charset="77"/>
-              <a:cs typeface="Arial" panose="020B0604020202020204" pitchFamily="34" charset="0"/>
-            </a:endParaRPr>
-          </a:p>
-          <a:p>
-            <a:pPr marL="800100" lvl="1" indent="-342900">
-              <a:spcBef>
-                <a:spcPts val="0"/>
-              </a:spcBef>
-              <a:buFont typeface="Symbol" pitchFamily="2" charset="2"/>
-              <a:buChar char=""/>
-            </a:pPr>
-            <a:r>
-              <a:rPr lang="en-US" sz="1400" kern="100" dirty="0">
-                <a:solidFill>
-                  <a:schemeClr val="bg1"/>
-                </a:solidFill>
-                <a:latin typeface="Abadi MT Condensed Light" panose="020B0306030101010103" pitchFamily="34" charset="77"/>
-                <a:cs typeface="Arial" panose="020B0604020202020204" pitchFamily="34" charset="0"/>
-                <a:hlinkClick r:id="rId5">
-                  <a:extLst>
-                    <a:ext uri="{A12FA001-AC4F-418D-AE19-62706E023703}">
-                      <ahyp:hlinkClr xmlns:ahyp="http://schemas.microsoft.com/office/drawing/2018/hyperlinkcolor" val="tx"/>
-                    </a:ext>
-                  </a:extLst>
-                </a:hlinkClick>
-              </a:rPr>
-              <a:t>https://www.fao.org/faostat/en/#data/ET</a:t>
-            </a:r>
-            <a:endParaRPr lang="en-US" sz="1400" kern="100" dirty="0">
-              <a:solidFill>
-                <a:schemeClr val="bg1"/>
-              </a:solidFill>
-              <a:latin typeface="Abadi MT Condensed Light" panose="020B0306030101010103" pitchFamily="34" charset="77"/>
-              <a:cs typeface="Arial" panose="020B0604020202020204" pitchFamily="34" charset="0"/>
-            </a:endParaRPr>
-          </a:p>
-          <a:p>
-            <a:pPr marL="800100" lvl="1" indent="-342900">
-              <a:spcBef>
-                <a:spcPts val="0"/>
-              </a:spcBef>
-              <a:buFont typeface="Symbol" pitchFamily="2" charset="2"/>
-              <a:buChar char=""/>
-            </a:pPr>
-            <a:r>
-              <a:rPr lang="en-US" sz="1400" kern="100" dirty="0">
-                <a:solidFill>
-                  <a:schemeClr val="bg1"/>
-                </a:solidFill>
-                <a:latin typeface="Abadi MT Condensed Light" panose="020B0306030101010103" pitchFamily="34" charset="77"/>
-                <a:cs typeface="Arial" panose="020B0604020202020204" pitchFamily="34" charset="0"/>
-                <a:hlinkClick r:id="rId6">
-                  <a:extLst>
-                    <a:ext uri="{A12FA001-AC4F-418D-AE19-62706E023703}">
-                      <ahyp:hlinkClr xmlns:ahyp="http://schemas.microsoft.com/office/drawing/2018/hyperlinkcolor" val="tx"/>
-                    </a:ext>
-                  </a:extLst>
-                </a:hlinkClick>
-              </a:rPr>
-              <a:t>https://www.oecd.org/sti/ind/carbondioxideemissionsembodiedininternationaltrade.htm</a:t>
-            </a:r>
-            <a:endParaRPr lang="en-US" sz="1400" kern="100" dirty="0">
               <a:solidFill>
                 <a:schemeClr val="bg1"/>
               </a:solidFill>

</xml_diff>